<commit_message>
fix to affine transform example
</commit_message>
<xml_diff>
--- a/slides/Sprites.pptx
+++ b/slides/Sprites.pptx
@@ -6515,14 +6515,14 @@
           </a:ln>
           <a:extLst>
             <a:ext uri="{909E8E84-426E-40dd-AFC4-6F175D3DCCD1}">
-              <a14:hiddenFill xmlns="" xmlns:a14="http://schemas.microsoft.com/office/drawing/2010/main">
+              <a14:hiddenFill xmlns:a14="http://schemas.microsoft.com/office/drawing/2010/main" xmlns="">
                 <a:solidFill>
                   <a:schemeClr val="accent1"/>
                 </a:solidFill>
               </a14:hiddenFill>
             </a:ext>
             <a:ext uri="{91240B29-F687-4f45-9708-019B960494DF}">
-              <a14:hiddenLine xmlns="" xmlns:a14="http://schemas.microsoft.com/office/drawing/2010/main" w="9525">
+              <a14:hiddenLine xmlns:a14="http://schemas.microsoft.com/office/drawing/2010/main" xmlns="" w="9525">
                 <a:solidFill>
                   <a:schemeClr val="tx1"/>
                 </a:solidFill>
@@ -8842,8 +8842,8 @@
           </a:p>
         </p:txBody>
       </p:sp>
-      <mc:AlternateContent xmlns:mc="http://schemas.openxmlformats.org/markup-compatibility/2006">
-        <mc:Choice xmlns:a14="http://schemas.microsoft.com/office/drawing/2010/main" Requires="a14">
+      <mc:AlternateContent xmlns:mc="http://schemas.openxmlformats.org/markup-compatibility/2006" xmlns:a14="http://schemas.microsoft.com/office/drawing/2010/main">
+        <mc:Choice Requires="a14">
           <p:sp>
             <p:nvSpPr>
               <p:cNvPr id="8" name="Rectangle 7"/>
@@ -8926,7 +8926,7 @@
             </p:txBody>
           </p:sp>
         </mc:Choice>
-        <mc:Fallback>
+        <mc:Fallback xmlns="">
           <p:sp>
             <p:nvSpPr>
               <p:cNvPr id="8" name="Rectangle 7"/>
@@ -9081,8 +9081,8 @@
           </a:p>
         </p:txBody>
       </p:sp>
-      <mc:AlternateContent xmlns:mc="http://schemas.openxmlformats.org/markup-compatibility/2006">
-        <mc:Choice xmlns:a14="http://schemas.microsoft.com/office/drawing/2010/main" Requires="a14">
+      <mc:AlternateContent xmlns:mc="http://schemas.openxmlformats.org/markup-compatibility/2006" xmlns:a14="http://schemas.microsoft.com/office/drawing/2010/main">
+        <mc:Choice Requires="a14">
           <p:sp>
             <p:nvSpPr>
               <p:cNvPr id="8" name="Rectangle 7"/>
@@ -9263,7 +9263,7 @@
             </p:txBody>
           </p:sp>
         </mc:Choice>
-        <mc:Fallback>
+        <mc:Fallback xmlns="">
           <p:sp>
             <p:nvSpPr>
               <p:cNvPr id="8" name="Rectangle 7"/>
@@ -9414,8 +9414,8 @@
           </a:p>
         </p:txBody>
       </p:sp>
-      <mc:AlternateContent xmlns:mc="http://schemas.openxmlformats.org/markup-compatibility/2006">
-        <mc:Choice xmlns:a14="http://schemas.microsoft.com/office/drawing/2010/main" Requires="a14">
+      <mc:AlternateContent xmlns:mc="http://schemas.openxmlformats.org/markup-compatibility/2006" xmlns:a14="http://schemas.microsoft.com/office/drawing/2010/main">
+        <mc:Choice Requires="a14">
           <p:sp>
             <p:nvSpPr>
               <p:cNvPr id="8" name="Rectangle 7"/>
@@ -9632,7 +9632,7 @@
             </p:txBody>
           </p:sp>
         </mc:Choice>
-        <mc:Fallback>
+        <mc:Fallback xmlns="">
           <p:sp>
             <p:nvSpPr>
               <p:cNvPr id="8" name="Rectangle 7"/>
@@ -9834,8 +9834,8 @@
           </a:p>
         </p:txBody>
       </p:sp>
-      <mc:AlternateContent xmlns:mc="http://schemas.openxmlformats.org/markup-compatibility/2006">
-        <mc:Choice xmlns:a14="http://schemas.microsoft.com/office/drawing/2010/main" Requires="a14">
+      <mc:AlternateContent xmlns:mc="http://schemas.openxmlformats.org/markup-compatibility/2006" xmlns:a14="http://schemas.microsoft.com/office/drawing/2010/main">
+        <mc:Choice Requires="a14">
           <p:sp>
             <p:nvSpPr>
               <p:cNvPr id="8" name="Rectangle 7"/>
@@ -10058,7 +10058,7 @@
             </p:txBody>
           </p:sp>
         </mc:Choice>
-        <mc:Fallback>
+        <mc:Fallback xmlns="">
           <p:sp>
             <p:nvSpPr>
               <p:cNvPr id="8" name="Rectangle 7"/>
@@ -10260,8 +10260,8 @@
           </a:p>
         </p:txBody>
       </p:sp>
-      <mc:AlternateContent xmlns:mc="http://schemas.openxmlformats.org/markup-compatibility/2006">
-        <mc:Choice xmlns:a14="http://schemas.microsoft.com/office/drawing/2010/main" Requires="a14">
+      <mc:AlternateContent xmlns:mc="http://schemas.openxmlformats.org/markup-compatibility/2006" xmlns:a14="http://schemas.microsoft.com/office/drawing/2010/main">
+        <mc:Choice Requires="a14">
           <p:sp>
             <p:nvSpPr>
               <p:cNvPr id="8" name="Rectangle 7"/>
@@ -10662,7 +10662,7 @@
             </p:txBody>
           </p:sp>
         </mc:Choice>
-        <mc:Fallback>
+        <mc:Fallback xmlns="">
           <p:sp>
             <p:nvSpPr>
               <p:cNvPr id="8" name="Rectangle 7"/>
@@ -10927,7 +10927,7 @@
                 </a14:m>
                 <a:r>
                   <a:rPr lang="en-US" dirty="0"/>
-                  <a:t> around the x axis, translate 10 units up z, and scale x by 0.5 </a:t>
+                  <a:t> around the x axis, translate 10 units up y, and scale x by 0.5 </a:t>
                 </a:r>
               </a:p>
               <a:p>
@@ -11016,8 +11016,8 @@
           </a:p>
         </p:txBody>
       </p:sp>
-      <mc:AlternateContent xmlns:mc="http://schemas.openxmlformats.org/markup-compatibility/2006" xmlns:a14="http://schemas.microsoft.com/office/drawing/2010/main">
-        <mc:Choice Requires="a14">
+      <mc:AlternateContent xmlns:mc="http://schemas.openxmlformats.org/markup-compatibility/2006">
+        <mc:Choice xmlns:a14="http://schemas.microsoft.com/office/drawing/2010/main" Requires="a14">
           <p:sp>
             <p:nvSpPr>
               <p:cNvPr id="8" name="Rectangle 7"/>
@@ -11027,7 +11027,7 @@
             <p:spPr>
               <a:xfrm>
                 <a:off x="152400" y="2460590"/>
-                <a:ext cx="8839200" cy="1730410"/>
+                <a:ext cx="9296400" cy="1283941"/>
               </a:xfrm>
               <a:prstGeom prst="rect">
                 <a:avLst/>
@@ -11057,87 +11057,51 @@
                           </m:ctrlPr>
                         </m:dPr>
                         <m:e>
-                          <m:m>
-                            <m:mPr>
-                              <m:mcs>
-                                <m:mc>
-                                  <m:mcPr>
-                                    <m:count m:val="1"/>
-                                    <m:mcJc m:val="center"/>
-                                  </m:mcPr>
-                                </m:mc>
-                              </m:mcs>
+                          <m:eqArr>
+                            <m:eqArrPr>
                               <m:ctrlPr>
-                                <a:rPr lang="en-US" sz="2800" i="1">
+                                <a:rPr lang="en-US" sz="2800" b="0" i="1" smtClean="0">
                                   <a:latin typeface="Cambria Math" panose="02040503050406030204" pitchFamily="18" charset="0"/>
                                 </a:rPr>
                               </m:ctrlPr>
-                            </m:mPr>
-                            <m:mr>
-                              <m:e>
-                                <m:r>
-                                  <a:rPr lang="en-US" sz="2800" i="1">
-                                    <a:latin typeface="Cambria Math"/>
-                                  </a:rPr>
-                                  <m:t>𝑥</m:t>
-                                </m:r>
-                                <m:r>
-                                  <a:rPr lang="en-US" sz="2800" i="1">
-                                    <a:latin typeface="Cambria Math"/>
-                                  </a:rPr>
-                                  <m:t>′</m:t>
-                                </m:r>
-                              </m:e>
-                            </m:mr>
-                            <m:mr>
-                              <m:e>
-                                <m:r>
-                                  <a:rPr lang="en-US" sz="2800" i="1">
-                                    <a:latin typeface="Cambria Math"/>
-                                  </a:rPr>
-                                  <m:t>𝑦</m:t>
-                                </m:r>
-                                <m:r>
-                                  <a:rPr lang="en-US" sz="2800" i="1">
-                                    <a:latin typeface="Cambria Math"/>
-                                  </a:rPr>
-                                  <m:t>′</m:t>
-                                </m:r>
-                              </m:e>
-                            </m:mr>
-                            <m:mr>
-                              <m:e>
-                                <m:r>
-                                  <a:rPr lang="en-US" sz="2800" i="1">
-                                    <a:latin typeface="Cambria Math"/>
-                                  </a:rPr>
-                                  <m:t>𝑧</m:t>
-                                </m:r>
-                                <m:r>
-                                  <a:rPr lang="en-US" sz="2800" i="1">
-                                    <a:latin typeface="Cambria Math"/>
-                                  </a:rPr>
-                                  <m:t>′</m:t>
-                                </m:r>
-                              </m:e>
-                            </m:mr>
-                            <m:mr>
-                              <m:e>
-                                <m:r>
-                                  <a:rPr lang="en-US" sz="2800" i="1">
-                                    <a:latin typeface="Cambria Math"/>
-                                  </a:rPr>
-                                  <m:t>𝑤</m:t>
-                                </m:r>
-                                <m:r>
-                                  <a:rPr lang="en-US" sz="2800" i="1">
-                                    <a:latin typeface="Cambria Math"/>
-                                  </a:rPr>
-                                  <m:t>′</m:t>
-                                </m:r>
-                              </m:e>
-                            </m:mr>
-                          </m:m>
+                            </m:eqArrPr>
+                            <m:e>
+                              <m:r>
+                                <a:rPr lang="en-US" sz="2800" b="0" i="1" smtClean="0">
+                                  <a:latin typeface="Cambria Math" panose="02040503050406030204" pitchFamily="18" charset="0"/>
+                                </a:rPr>
+                                <m:t>𝑥</m:t>
+                              </m:r>
+                              <m:r>
+                                <a:rPr lang="en-US" sz="2800" b="0" i="1" smtClean="0">
+                                  <a:latin typeface="Cambria Math" panose="02040503050406030204" pitchFamily="18" charset="0"/>
+                                </a:rPr>
+                                <m:t>′</m:t>
+                              </m:r>
+                            </m:e>
+                            <m:e>
+                              <m:r>
+                                <a:rPr lang="en-US" sz="2800" b="0" i="1" smtClean="0">
+                                  <a:latin typeface="Cambria Math" panose="02040503050406030204" pitchFamily="18" charset="0"/>
+                                </a:rPr>
+                                <m:t>𝑦</m:t>
+                              </m:r>
+                              <m:r>
+                                <a:rPr lang="en-US" sz="2800" b="0" i="1" smtClean="0">
+                                  <a:latin typeface="Cambria Math" panose="02040503050406030204" pitchFamily="18" charset="0"/>
+                                </a:rPr>
+                                <m:t>′</m:t>
+                              </m:r>
+                            </m:e>
+                            <m:e>
+                              <m:r>
+                                <a:rPr lang="en-US" sz="2800" b="0" i="1" smtClean="0">
+                                  <a:latin typeface="Cambria Math" panose="02040503050406030204" pitchFamily="18" charset="0"/>
+                                </a:rPr>
+                                <m:t>1</m:t>
+                              </m:r>
+                            </m:e>
+                          </m:eqArr>
                         </m:e>
                       </m:d>
                       <m:r>
@@ -11162,13 +11126,13 @@
                               <m:mcs>
                                 <m:mc>
                                   <m:mcPr>
-                                    <m:count m:val="4"/>
+                                    <m:count m:val="3"/>
                                     <m:mcJc m:val="center"/>
                                   </m:mcPr>
                                 </m:mc>
                               </m:mcs>
                               <m:ctrlPr>
-                                <a:rPr lang="en-US" sz="2800" i="1">
+                                <a:rPr lang="en-US" sz="2800" i="1" smtClean="0">
                                   <a:latin typeface="Cambria Math" panose="02040503050406030204" pitchFamily="18" charset="0"/>
                                 </a:rPr>
                               </m:ctrlPr>
@@ -11176,32 +11140,27 @@
                             <m:mr>
                               <m:e>
                                 <m:r>
-                                  <a:rPr lang="en-US" sz="2800" i="1">
-                                    <a:latin typeface="Cambria Math"/>
+                                  <m:rPr>
+                                    <m:brk m:alnAt="7"/>
+                                  </m:rPr>
+                                  <a:rPr lang="en-US" sz="2800" b="0" i="1" smtClean="0">
+                                    <a:latin typeface="Cambria Math" panose="02040503050406030204" pitchFamily="18" charset="0"/>
                                   </a:rPr>
                                   <m:t>0.5</m:t>
                                 </m:r>
                               </m:e>
                               <m:e>
                                 <m:r>
-                                  <a:rPr lang="en-US" sz="2800" i="1">
-                                    <a:latin typeface="Cambria Math"/>
+                                  <a:rPr lang="en-US" sz="2800" b="0" i="1" smtClean="0">
+                                    <a:latin typeface="Cambria Math" panose="02040503050406030204" pitchFamily="18" charset="0"/>
                                   </a:rPr>
                                   <m:t>0</m:t>
                                 </m:r>
                               </m:e>
                               <m:e>
                                 <m:r>
-                                  <a:rPr lang="en-US" sz="2800" i="1">
-                                    <a:latin typeface="Cambria Math"/>
-                                  </a:rPr>
-                                  <m:t>0</m:t>
-                                </m:r>
-                              </m:e>
-                              <m:e>
-                                <m:r>
-                                  <a:rPr lang="en-US" sz="2800" i="1">
-                                    <a:latin typeface="Cambria Math"/>
+                                  <a:rPr lang="en-US" sz="2800" b="0" i="1" smtClean="0">
+                                    <a:latin typeface="Cambria Math" panose="02040503050406030204" pitchFamily="18" charset="0"/>
                                   </a:rPr>
                                   <m:t>0</m:t>
                                 </m:r>
@@ -11210,66 +11169,24 @@
                             <m:mr>
                               <m:e>
                                 <m:r>
-                                  <a:rPr lang="en-US" sz="2800" i="1">
-                                    <a:latin typeface="Cambria Math"/>
+                                  <a:rPr lang="en-US" sz="2800" b="0" i="1" smtClean="0">
+                                    <a:latin typeface="Cambria Math" panose="02040503050406030204" pitchFamily="18" charset="0"/>
                                   </a:rPr>
                                   <m:t>0</m:t>
                                 </m:r>
                               </m:e>
                               <m:e>
                                 <m:r>
-                                  <a:rPr lang="en-US" sz="2800" i="1">
-                                    <a:latin typeface="Cambria Math"/>
+                                  <a:rPr lang="en-US" sz="2800" b="0" i="1" smtClean="0">
+                                    <a:latin typeface="Cambria Math" panose="02040503050406030204" pitchFamily="18" charset="0"/>
                                   </a:rPr>
                                   <m:t>1</m:t>
                                 </m:r>
                               </m:e>
                               <m:e>
                                 <m:r>
-                                  <a:rPr lang="en-US" sz="2800" i="1">
-                                    <a:latin typeface="Cambria Math"/>
-                                  </a:rPr>
-                                  <m:t>0</m:t>
-                                </m:r>
-                              </m:e>
-                              <m:e>
-                                <m:r>
-                                  <a:rPr lang="en-US" sz="2800" i="1">
-                                    <a:latin typeface="Cambria Math"/>
-                                  </a:rPr>
-                                  <m:t>0</m:t>
-                                </m:r>
-                              </m:e>
-                            </m:mr>
-                            <m:mr>
-                              <m:e>
-                                <m:r>
-                                  <a:rPr lang="en-US" sz="2800" i="1">
-                                    <a:latin typeface="Cambria Math"/>
-                                  </a:rPr>
-                                  <m:t>0</m:t>
-                                </m:r>
-                              </m:e>
-                              <m:e>
-                                <m:r>
-                                  <a:rPr lang="en-US" sz="2800" i="1">
-                                    <a:latin typeface="Cambria Math"/>
-                                  </a:rPr>
-                                  <m:t>0</m:t>
-                                </m:r>
-                              </m:e>
-                              <m:e>
-                                <m:r>
-                                  <a:rPr lang="en-US" sz="2800" i="1">
-                                    <a:latin typeface="Cambria Math"/>
-                                  </a:rPr>
-                                  <m:t>1</m:t>
-                                </m:r>
-                              </m:e>
-                              <m:e>
-                                <m:r>
-                                  <a:rPr lang="en-US" sz="2800" i="1">
-                                    <a:latin typeface="Cambria Math"/>
+                                  <a:rPr lang="en-US" sz="2800" b="0" i="1" smtClean="0">
+                                    <a:latin typeface="Cambria Math" panose="02040503050406030204" pitchFamily="18" charset="0"/>
                                   </a:rPr>
                                   <m:t>10</m:t>
                                 </m:r>
@@ -11278,32 +11195,24 @@
                             <m:mr>
                               <m:e>
                                 <m:r>
-                                  <a:rPr lang="en-US" sz="2800" i="1">
-                                    <a:latin typeface="Cambria Math"/>
+                                  <a:rPr lang="en-US" sz="2800" b="0" i="1" smtClean="0">
+                                    <a:latin typeface="Cambria Math" panose="02040503050406030204" pitchFamily="18" charset="0"/>
                                   </a:rPr>
                                   <m:t>0</m:t>
                                 </m:r>
                               </m:e>
                               <m:e>
                                 <m:r>
-                                  <a:rPr lang="en-US" sz="2800" i="1">
-                                    <a:latin typeface="Cambria Math"/>
+                                  <a:rPr lang="en-US" sz="2800" b="0" i="1" smtClean="0">
+                                    <a:latin typeface="Cambria Math" panose="02040503050406030204" pitchFamily="18" charset="0"/>
                                   </a:rPr>
                                   <m:t>0</m:t>
                                 </m:r>
                               </m:e>
                               <m:e>
                                 <m:r>
-                                  <a:rPr lang="en-US" sz="2800" i="1">
-                                    <a:latin typeface="Cambria Math"/>
-                                  </a:rPr>
-                                  <m:t>0</m:t>
-                                </m:r>
-                              </m:e>
-                              <m:e>
-                                <m:r>
-                                  <a:rPr lang="en-US" sz="2800" i="1">
-                                    <a:latin typeface="Cambria Math"/>
+                                  <a:rPr lang="en-US" sz="2800" b="0" i="1" smtClean="0">
+                                    <a:latin typeface="Cambria Math" panose="02040503050406030204" pitchFamily="18" charset="0"/>
                                   </a:rPr>
                                   <m:t>1</m:t>
                                 </m:r>
@@ -11328,13 +11237,13 @@
                               <m:mcs>
                                 <m:mc>
                                   <m:mcPr>
-                                    <m:count m:val="4"/>
+                                    <m:count m:val="3"/>
                                     <m:mcJc m:val="center"/>
                                   </m:mcPr>
                                 </m:mc>
                               </m:mcs>
                               <m:ctrlPr>
-                                <a:rPr lang="en-US" sz="2800" i="1">
+                                <a:rPr lang="en-US" sz="2800" i="1" smtClean="0">
                                   <a:latin typeface="Cambria Math" panose="02040503050406030204" pitchFamily="18" charset="0"/>
                                 </a:rPr>
                               </m:ctrlPr>
@@ -11342,32 +11251,52 @@
                             <m:mr>
                               <m:e>
                                 <m:r>
-                                  <a:rPr lang="en-US" sz="2800" i="1">
-                                    <a:latin typeface="Cambria Math"/>
+                                  <m:rPr>
+                                    <m:sty m:val="p"/>
+                                    <m:brk m:alnAt="7"/>
+                                  </m:rPr>
+                                  <a:rPr lang="en-US" sz="2800" b="0" i="0" smtClean="0">
+                                    <a:latin typeface="Cambria Math" panose="02040503050406030204" pitchFamily="18" charset="0"/>
                                   </a:rPr>
-                                  <m:t>1</m:t>
+                                  <m:t>cos</m:t>
+                                </m:r>
+                                <m:r>
+                                  <m:rPr>
+                                    <m:brk m:alnAt="7"/>
+                                  </m:rPr>
+                                  <a:rPr lang="en-US" sz="2800" b="0" i="1" smtClean="0">
+                                    <a:latin typeface="Cambria Math" panose="02040503050406030204" pitchFamily="18" charset="0"/>
+                                  </a:rPr>
+                                  <m:t>⁡(45)</m:t>
                                 </m:r>
                               </m:e>
                               <m:e>
                                 <m:r>
-                                  <a:rPr lang="en-US" sz="2800" i="1">
-                                    <a:latin typeface="Cambria Math"/>
+                                  <a:rPr lang="en-US" sz="2800" b="0" i="1" smtClean="0">
+                                    <a:latin typeface="Cambria Math" panose="02040503050406030204" pitchFamily="18" charset="0"/>
                                   </a:rPr>
-                                  <m:t>0</m:t>
+                                  <m:t>−</m:t>
+                                </m:r>
+                                <m:r>
+                                  <m:rPr>
+                                    <m:sty m:val="p"/>
+                                  </m:rPr>
+                                  <a:rPr lang="en-US" sz="2800" b="0" i="0" smtClean="0">
+                                    <a:latin typeface="Cambria Math" panose="02040503050406030204" pitchFamily="18" charset="0"/>
+                                  </a:rPr>
+                                  <m:t>sin</m:t>
+                                </m:r>
+                                <m:r>
+                                  <a:rPr lang="en-US" sz="2800" b="0" i="1" smtClean="0">
+                                    <a:latin typeface="Cambria Math" panose="02040503050406030204" pitchFamily="18" charset="0"/>
+                                  </a:rPr>
+                                  <m:t>⁡(45)</m:t>
                                 </m:r>
                               </m:e>
                               <m:e>
                                 <m:r>
-                                  <a:rPr lang="en-US" sz="2800" i="1">
-                                    <a:latin typeface="Cambria Math"/>
-                                  </a:rPr>
-                                  <m:t>0</m:t>
-                                </m:r>
-                              </m:e>
-                              <m:e>
-                                <m:r>
-                                  <a:rPr lang="en-US" sz="2800" i="1">
-                                    <a:latin typeface="Cambria Math"/>
+                                  <a:rPr lang="en-US" sz="2800" b="0" i="1" smtClean="0">
+                                    <a:latin typeface="Cambria Math" panose="02040503050406030204" pitchFamily="18" charset="0"/>
                                   </a:rPr>
                                   <m:t>0</m:t>
                                 </m:r>
@@ -11376,96 +11305,42 @@
                             <m:mr>
                               <m:e>
                                 <m:r>
-                                  <a:rPr lang="en-US" sz="2800" i="1">
-                                    <a:latin typeface="Cambria Math"/>
+                                  <m:rPr>
+                                    <m:sty m:val="p"/>
+                                  </m:rPr>
+                                  <a:rPr lang="en-US" sz="2800" b="0" i="0" smtClean="0">
+                                    <a:latin typeface="Cambria Math" panose="02040503050406030204" pitchFamily="18" charset="0"/>
                                   </a:rPr>
-                                  <m:t>0</m:t>
+                                  <m:t>sin</m:t>
+                                </m:r>
+                                <m:r>
+                                  <a:rPr lang="en-US" sz="2800" b="0" i="1" smtClean="0">
+                                    <a:latin typeface="Cambria Math" panose="02040503050406030204" pitchFamily="18" charset="0"/>
+                                  </a:rPr>
+                                  <m:t>⁡(45)</m:t>
                                 </m:r>
                               </m:e>
                               <m:e>
-                                <m:func>
-                                  <m:funcPr>
-                                    <m:ctrlPr>
-                                      <a:rPr lang="en-US" sz="2800" i="1">
-                                        <a:latin typeface="Cambria Math" panose="02040503050406030204" pitchFamily="18" charset="0"/>
-                                      </a:rPr>
-                                    </m:ctrlPr>
-                                  </m:funcPr>
-                                  <m:fName>
-                                    <m:r>
-                                      <m:rPr>
-                                        <m:sty m:val="p"/>
-                                      </m:rPr>
-                                      <a:rPr lang="en-US" sz="2800">
-                                        <a:latin typeface="Cambria Math"/>
-                                      </a:rPr>
-                                      <m:t>cos</m:t>
-                                    </m:r>
-                                  </m:fName>
-                                  <m:e>
-                                    <m:r>
-                                      <a:rPr lang="en-US" sz="2800" b="0" i="1" smtClean="0">
-                                        <a:latin typeface="Cambria Math"/>
-                                      </a:rPr>
-                                      <m:t>45</m:t>
-                                    </m:r>
-                                    <m:r>
-                                      <a:rPr lang="en-US" sz="2800" b="0" i="1" smtClean="0">
-                                        <a:latin typeface="Cambria Math"/>
-                                        <a:ea typeface="Cambria Math"/>
-                                      </a:rPr>
-                                      <m:t>°</m:t>
-                                    </m:r>
-                                  </m:e>
-                                </m:func>
+                                <m:r>
+                                  <m:rPr>
+                                    <m:sty m:val="p"/>
+                                  </m:rPr>
+                                  <a:rPr lang="en-US" sz="2800" b="0" i="0" smtClean="0">
+                                    <a:latin typeface="Cambria Math" panose="02040503050406030204" pitchFamily="18" charset="0"/>
+                                  </a:rPr>
+                                  <m:t>cos</m:t>
+                                </m:r>
+                                <m:r>
+                                  <a:rPr lang="en-US" sz="2800" b="0" i="1" smtClean="0">
+                                    <a:latin typeface="Cambria Math" panose="02040503050406030204" pitchFamily="18" charset="0"/>
+                                  </a:rPr>
+                                  <m:t>⁡(45)</m:t>
+                                </m:r>
                               </m:e>
                               <m:e>
                                 <m:r>
-                                  <a:rPr lang="en-US" sz="2800" i="1">
-                                    <a:latin typeface="Cambria Math"/>
-                                  </a:rPr>
-                                  <m:t>−</m:t>
-                                </m:r>
-                                <m:func>
-                                  <m:funcPr>
-                                    <m:ctrlPr>
-                                      <a:rPr lang="en-US" sz="2800" i="1">
-                                        <a:latin typeface="Cambria Math" panose="02040503050406030204" pitchFamily="18" charset="0"/>
-                                      </a:rPr>
-                                    </m:ctrlPr>
-                                  </m:funcPr>
-                                  <m:fName>
-                                    <m:r>
-                                      <m:rPr>
-                                        <m:sty m:val="p"/>
-                                      </m:rPr>
-                                      <a:rPr lang="en-US" sz="2800">
-                                        <a:latin typeface="Cambria Math"/>
-                                      </a:rPr>
-                                      <m:t>sin</m:t>
-                                    </m:r>
-                                  </m:fName>
-                                  <m:e>
-                                    <m:r>
-                                      <a:rPr lang="en-US" sz="2800" i="1">
-                                        <a:latin typeface="Cambria Math"/>
-                                      </a:rPr>
-                                      <m:t>45</m:t>
-                                    </m:r>
-                                    <m:r>
-                                      <a:rPr lang="en-US" sz="2800" i="1">
-                                        <a:latin typeface="Cambria Math"/>
-                                        <a:ea typeface="Cambria Math"/>
-                                      </a:rPr>
-                                      <m:t>°</m:t>
-                                    </m:r>
-                                  </m:e>
-                                </m:func>
-                              </m:e>
-                              <m:e>
-                                <m:r>
-                                  <a:rPr lang="en-US" sz="2800" i="1">
-                                    <a:latin typeface="Cambria Math"/>
+                                  <a:rPr lang="en-US" sz="2800" b="0" i="1" smtClean="0">
+                                    <a:latin typeface="Cambria Math" panose="02040503050406030204" pitchFamily="18" charset="0"/>
                                   </a:rPr>
                                   <m:t>0</m:t>
                                 </m:r>
@@ -11474,124 +11349,24 @@
                             <m:mr>
                               <m:e>
                                 <m:r>
-                                  <a:rPr lang="en-US" sz="2800" i="1">
-                                    <a:latin typeface="Cambria Math"/>
-                                  </a:rPr>
-                                  <m:t>0</m:t>
-                                </m:r>
-                              </m:e>
-                              <m:e>
-                                <m:func>
-                                  <m:funcPr>
-                                    <m:ctrlPr>
-                                      <a:rPr lang="en-US" sz="2800" i="1">
-                                        <a:latin typeface="Cambria Math" panose="02040503050406030204" pitchFamily="18" charset="0"/>
-                                      </a:rPr>
-                                    </m:ctrlPr>
-                                  </m:funcPr>
-                                  <m:fName>
-                                    <m:r>
-                                      <m:rPr>
-                                        <m:sty m:val="p"/>
-                                      </m:rPr>
-                                      <a:rPr lang="en-US" sz="2800">
-                                        <a:latin typeface="Cambria Math"/>
-                                      </a:rPr>
-                                      <m:t>sin</m:t>
-                                    </m:r>
-                                  </m:fName>
-                                  <m:e>
-                                    <m:r>
-                                      <a:rPr lang="en-US" sz="2800" i="1">
-                                        <a:latin typeface="Cambria Math"/>
-                                      </a:rPr>
-                                      <m:t>45</m:t>
-                                    </m:r>
-                                    <m:r>
-                                      <a:rPr lang="en-US" sz="2800" i="1">
-                                        <a:latin typeface="Cambria Math"/>
-                                        <a:ea typeface="Cambria Math"/>
-                                      </a:rPr>
-                                      <m:t>°</m:t>
-                                    </m:r>
-                                  </m:e>
-                                </m:func>
-                              </m:e>
-                              <m:e>
-                                <m:func>
-                                  <m:funcPr>
-                                    <m:ctrlPr>
-                                      <a:rPr lang="en-US" sz="2800" i="1">
-                                        <a:latin typeface="Cambria Math" panose="02040503050406030204" pitchFamily="18" charset="0"/>
-                                      </a:rPr>
-                                    </m:ctrlPr>
-                                  </m:funcPr>
-                                  <m:fName>
-                                    <m:r>
-                                      <m:rPr>
-                                        <m:sty m:val="p"/>
-                                      </m:rPr>
-                                      <a:rPr lang="en-US" sz="2800">
-                                        <a:latin typeface="Cambria Math"/>
-                                      </a:rPr>
-                                      <m:t>cos</m:t>
-                                    </m:r>
-                                  </m:fName>
-                                  <m:e>
-                                    <m:r>
-                                      <a:rPr lang="en-US" sz="2800" i="1">
-                                        <a:latin typeface="Cambria Math"/>
-                                      </a:rPr>
-                                      <m:t>45</m:t>
-                                    </m:r>
-                                    <m:r>
-                                      <a:rPr lang="en-US" sz="2800" i="1">
-                                        <a:latin typeface="Cambria Math"/>
-                                        <a:ea typeface="Cambria Math"/>
-                                      </a:rPr>
-                                      <m:t>°</m:t>
-                                    </m:r>
-                                  </m:e>
-                                </m:func>
-                              </m:e>
-                              <m:e>
-                                <m:r>
-                                  <a:rPr lang="en-US" sz="2800" i="1">
-                                    <a:latin typeface="Cambria Math"/>
-                                  </a:rPr>
-                                  <m:t>0</m:t>
-                                </m:r>
-                              </m:e>
-                            </m:mr>
-                            <m:mr>
-                              <m:e>
-                                <m:r>
-                                  <a:rPr lang="en-US" sz="2800" i="1">
-                                    <a:latin typeface="Cambria Math"/>
+                                  <a:rPr lang="en-US" sz="2800" b="0" i="1" smtClean="0">
+                                    <a:latin typeface="Cambria Math" panose="02040503050406030204" pitchFamily="18" charset="0"/>
                                   </a:rPr>
                                   <m:t>0</m:t>
                                 </m:r>
                               </m:e>
                               <m:e>
                                 <m:r>
-                                  <a:rPr lang="en-US" sz="2800" i="1">
-                                    <a:latin typeface="Cambria Math"/>
+                                  <a:rPr lang="en-US" sz="2800" b="0" i="1" smtClean="0">
+                                    <a:latin typeface="Cambria Math" panose="02040503050406030204" pitchFamily="18" charset="0"/>
                                   </a:rPr>
                                   <m:t>0</m:t>
                                 </m:r>
                               </m:e>
                               <m:e>
                                 <m:r>
-                                  <a:rPr lang="en-US" sz="2800" i="1">
-                                    <a:latin typeface="Cambria Math"/>
-                                  </a:rPr>
-                                  <m:t>0</m:t>
-                                </m:r>
-                              </m:e>
-                              <m:e>
-                                <m:r>
-                                  <a:rPr lang="en-US" sz="2800" i="1">
-                                    <a:latin typeface="Cambria Math"/>
+                                  <a:rPr lang="en-US" sz="2800" b="0" i="1" smtClean="0">
+                                    <a:latin typeface="Cambria Math" panose="02040503050406030204" pitchFamily="18" charset="0"/>
                                   </a:rPr>
                                   <m:t>1</m:t>
                                 </m:r>
@@ -11622,7 +11397,7 @@
                                 </m:mc>
                               </m:mcs>
                               <m:ctrlPr>
-                                <a:rPr lang="en-US" sz="2800" i="1">
+                                <a:rPr lang="en-US" sz="2800" i="1" smtClean="0">
                                   <a:latin typeface="Cambria Math" panose="02040503050406030204" pitchFamily="18" charset="0"/>
                                 </a:rPr>
                               </m:ctrlPr>
@@ -11630,8 +11405,11 @@
                             <m:mr>
                               <m:e>
                                 <m:r>
-                                  <a:rPr lang="en-US" sz="2800" i="1">
-                                    <a:latin typeface="Cambria Math"/>
+                                  <m:rPr>
+                                    <m:brk m:alnAt="7"/>
+                                  </m:rPr>
+                                  <a:rPr lang="en-US" sz="2800" b="0" i="1" smtClean="0">
+                                    <a:latin typeface="Cambria Math" panose="02040503050406030204" pitchFamily="18" charset="0"/>
                                   </a:rPr>
                                   <m:t>𝑥</m:t>
                                 </m:r>
@@ -11640,8 +11418,8 @@
                             <m:mr>
                               <m:e>
                                 <m:r>
-                                  <a:rPr lang="en-US" sz="2800" i="1">
-                                    <a:latin typeface="Cambria Math"/>
+                                  <a:rPr lang="en-US" sz="2800" b="0" i="1" smtClean="0">
+                                    <a:latin typeface="Cambria Math" panose="02040503050406030204" pitchFamily="18" charset="0"/>
                                   </a:rPr>
                                   <m:t>𝑦</m:t>
                                 </m:r>
@@ -11650,20 +11428,10 @@
                             <m:mr>
                               <m:e>
                                 <m:r>
-                                  <a:rPr lang="en-US" sz="2800" i="1">
-                                    <a:latin typeface="Cambria Math"/>
+                                  <a:rPr lang="en-US" sz="2800" b="0" i="1" smtClean="0">
+                                    <a:latin typeface="Cambria Math" panose="02040503050406030204" pitchFamily="18" charset="0"/>
                                   </a:rPr>
-                                  <m:t>𝑧</m:t>
-                                </m:r>
-                              </m:e>
-                            </m:mr>
-                            <m:mr>
-                              <m:e>
-                                <m:r>
-                                  <a:rPr lang="en-US" sz="2800" i="1">
-                                    <a:latin typeface="Cambria Math"/>
-                                  </a:rPr>
-                                  <m:t>𝑤</m:t>
+                                  <m:t>1</m:t>
                                 </m:r>
                               </m:e>
                             </m:mr>
@@ -11678,7 +11446,7 @@
             </p:txBody>
           </p:sp>
         </mc:Choice>
-        <mc:Fallback xmlns="">
+        <mc:Fallback>
           <p:sp>
             <p:nvSpPr>
               <p:cNvPr id="8" name="Rectangle 7"/>
@@ -11690,15 +11458,15 @@
             <p:spPr>
               <a:xfrm>
                 <a:off x="152400" y="2460590"/>
-                <a:ext cx="8839200" cy="1730410"/>
+                <a:ext cx="9296400" cy="1283941"/>
               </a:xfrm>
               <a:prstGeom prst="rect">
                 <a:avLst/>
               </a:prstGeom>
-              <a:blipFill rotWithShape="1">
+              <a:blipFill>
                 <a:blip r:embed="rId3"/>
                 <a:stretch>
-                  <a:fillRect/>
+                  <a:fillRect t="-980" b="-4902"/>
                 </a:stretch>
               </a:blipFill>
             </p:spPr>
@@ -12022,14 +11790,14 @@
           </a:ln>
           <a:extLst>
             <a:ext uri="{909E8E84-426E-40dd-AFC4-6F175D3DCCD1}">
-              <a14:hiddenFill xmlns="" xmlns:a14="http://schemas.microsoft.com/office/drawing/2010/main">
+              <a14:hiddenFill xmlns:a14="http://schemas.microsoft.com/office/drawing/2010/main" xmlns="">
                 <a:solidFill>
                   <a:schemeClr val="accent1"/>
                 </a:solidFill>
               </a14:hiddenFill>
             </a:ext>
             <a:ext uri="{91240B29-F687-4f45-9708-019B960494DF}">
-              <a14:hiddenLine xmlns="" xmlns:a14="http://schemas.microsoft.com/office/drawing/2010/main" w="9525">
+              <a14:hiddenLine xmlns:a14="http://schemas.microsoft.com/office/drawing/2010/main" xmlns="" w="9525">
                 <a:solidFill>
                   <a:schemeClr val="tx1"/>
                 </a:solidFill>

</xml_diff>

<commit_message>
small changes to sprites slides
</commit_message>
<xml_diff>
--- a/slides/Sprites.pptx
+++ b/slides/Sprites.pptx
@@ -5872,7 +5872,21 @@
                 <a:latin typeface="Courier New"/>
                 <a:cs typeface="Courier New"/>
               </a:rPr>
-              <a:t>protected override void Draw(Graphics g)</a:t>
+              <a:t>protected override void Draw(</a:t>
+            </a:r>
+            <a:r>
+              <a:rPr lang="en-US" sz="1400" dirty="0" err="1">
+                <a:latin typeface="Courier New"/>
+                <a:cs typeface="Courier New"/>
+              </a:rPr>
+              <a:t>AffineTransform</a:t>
+            </a:r>
+            <a:r>
+              <a:rPr lang="en-US" sz="1400" dirty="0">
+                <a:latin typeface="Courier New"/>
+                <a:cs typeface="Courier New"/>
+              </a:rPr>
+              <a:t> g)</a:t>
             </a:r>
           </a:p>
           <a:p>
@@ -6515,14 +6529,14 @@
           </a:ln>
           <a:extLst>
             <a:ext uri="{909E8E84-426E-40dd-AFC4-6F175D3DCCD1}">
-              <a14:hiddenFill xmlns:a14="http://schemas.microsoft.com/office/drawing/2010/main" xmlns="">
+              <a14:hiddenFill xmlns="" xmlns:a14="http://schemas.microsoft.com/office/drawing/2010/main">
                 <a:solidFill>
                   <a:schemeClr val="accent1"/>
                 </a:solidFill>
               </a14:hiddenFill>
             </a:ext>
             <a:ext uri="{91240B29-F687-4f45-9708-019B960494DF}">
-              <a14:hiddenLine xmlns:a14="http://schemas.microsoft.com/office/drawing/2010/main" xmlns="" w="9525">
+              <a14:hiddenLine xmlns="" xmlns:a14="http://schemas.microsoft.com/office/drawing/2010/main" w="9525">
                 <a:solidFill>
                   <a:schemeClr val="tx1"/>
                 </a:solidFill>
@@ -10887,8 +10901,8 @@
           </a:p>
         </p:txBody>
       </p:sp>
-      <mc:AlternateContent xmlns:mc="http://schemas.openxmlformats.org/markup-compatibility/2006">
-        <mc:Choice xmlns:a14="http://schemas.microsoft.com/office/drawing/2010/main" Requires="a14">
+      <mc:AlternateContent xmlns:mc="http://schemas.openxmlformats.org/markup-compatibility/2006" xmlns:a14="http://schemas.microsoft.com/office/drawing/2010/main">
+        <mc:Choice Requires="a14">
           <p:sp>
             <p:nvSpPr>
               <p:cNvPr id="9" name="Content Placeholder 8"/>
@@ -10958,7 +10972,7 @@
             </p:txBody>
           </p:sp>
         </mc:Choice>
-        <mc:Fallback>
+        <mc:Fallback xmlns="">
           <p:sp>
             <p:nvSpPr>
               <p:cNvPr id="9" name="Content Placeholder 8"/>
@@ -11016,8 +11030,8 @@
           </a:p>
         </p:txBody>
       </p:sp>
-      <mc:AlternateContent xmlns:mc="http://schemas.openxmlformats.org/markup-compatibility/2006">
-        <mc:Choice xmlns:a14="http://schemas.microsoft.com/office/drawing/2010/main" Requires="a14">
+      <mc:AlternateContent xmlns:mc="http://schemas.openxmlformats.org/markup-compatibility/2006" xmlns:a14="http://schemas.microsoft.com/office/drawing/2010/main">
+        <mc:Choice Requires="a14">
           <p:sp>
             <p:nvSpPr>
               <p:cNvPr id="8" name="Rectangle 7"/>
@@ -11146,7 +11160,13 @@
                                   <a:rPr lang="en-US" sz="2800" b="0" i="1" smtClean="0">
                                     <a:latin typeface="Cambria Math" panose="02040503050406030204" pitchFamily="18" charset="0"/>
                                   </a:rPr>
-                                  <m:t>0.5</m:t>
+                                  <m:t>0</m:t>
+                                </m:r>
+                                <m:r>
+                                  <a:rPr lang="en-US" sz="2800" b="0" i="1" smtClean="0">
+                                    <a:latin typeface="Cambria Math" panose="02040503050406030204" pitchFamily="18" charset="0"/>
+                                  </a:rPr>
+                                  <m:t>.5</m:t>
                                 </m:r>
                               </m:e>
                               <m:e>
@@ -11258,7 +11278,16 @@
                                   <a:rPr lang="en-US" sz="2800" b="0" i="0" smtClean="0">
                                     <a:latin typeface="Cambria Math" panose="02040503050406030204" pitchFamily="18" charset="0"/>
                                   </a:rPr>
-                                  <m:t>cos</m:t>
+                                  <m:t>c</m:t>
+                                </m:r>
+                                <m:r>
+                                  <m:rPr>
+                                    <m:sty m:val="p"/>
+                                  </m:rPr>
+                                  <a:rPr lang="en-US" sz="2800" b="0" i="0" smtClean="0">
+                                    <a:latin typeface="Cambria Math" panose="02040503050406030204" pitchFamily="18" charset="0"/>
+                                  </a:rPr>
+                                  <m:t>os</m:t>
                                 </m:r>
                                 <m:r>
                                   <m:rPr>
@@ -11267,7 +11296,13 @@
                                   <a:rPr lang="en-US" sz="2800" b="0" i="1" smtClean="0">
                                     <a:latin typeface="Cambria Math" panose="02040503050406030204" pitchFamily="18" charset="0"/>
                                   </a:rPr>
-                                  <m:t>⁡(45)</m:t>
+                                  <m:t>⁡</m:t>
+                                </m:r>
+                                <m:r>
+                                  <a:rPr lang="en-US" sz="2800" b="0" i="1" smtClean="0">
+                                    <a:latin typeface="Cambria Math" panose="02040503050406030204" pitchFamily="18" charset="0"/>
+                                  </a:rPr>
+                                  <m:t>(45)</m:t>
                                 </m:r>
                               </m:e>
                               <m:e>
@@ -11446,7 +11481,7 @@
             </p:txBody>
           </p:sp>
         </mc:Choice>
-        <mc:Fallback>
+        <mc:Fallback xmlns="">
           <p:sp>
             <p:nvSpPr>
               <p:cNvPr id="8" name="Rectangle 7"/>
@@ -11790,14 +11825,14 @@
           </a:ln>
           <a:extLst>
             <a:ext uri="{909E8E84-426E-40dd-AFC4-6F175D3DCCD1}">
-              <a14:hiddenFill xmlns:a14="http://schemas.microsoft.com/office/drawing/2010/main" xmlns="">
+              <a14:hiddenFill xmlns="" xmlns:a14="http://schemas.microsoft.com/office/drawing/2010/main">
                 <a:solidFill>
                   <a:schemeClr val="accent1"/>
                 </a:solidFill>
               </a14:hiddenFill>
             </a:ext>
             <a:ext uri="{91240B29-F687-4f45-9708-019B960494DF}">
-              <a14:hiddenLine xmlns:a14="http://schemas.microsoft.com/office/drawing/2010/main" xmlns="" w="9525">
+              <a14:hiddenLine xmlns="" xmlns:a14="http://schemas.microsoft.com/office/drawing/2010/main" w="9525">
                 <a:solidFill>
                   <a:schemeClr val="tx1"/>
                 </a:solidFill>
@@ -11856,7 +11891,7 @@
           <a:p>
             <a:r>
               <a:rPr lang="en-US" dirty="0"/>
-              <a:t>Transformations</a:t>
+              <a:t>Animations</a:t>
             </a:r>
           </a:p>
         </p:txBody>

</xml_diff>

<commit_message>
updating slides page with newest lecture material
</commit_message>
<xml_diff>
--- a/slides/Sprites.pptx
+++ b/slides/Sprites.pptx
@@ -5,10 +5,10 @@
     <p:sldMasterId id="2147483648" r:id="rId1"/>
   </p:sldMasterIdLst>
   <p:notesMasterIdLst>
-    <p:notesMasterId r:id="rId42"/>
+    <p:notesMasterId r:id="rId46"/>
   </p:notesMasterIdLst>
   <p:handoutMasterIdLst>
-    <p:handoutMasterId r:id="rId43"/>
+    <p:handoutMasterId r:id="rId47"/>
   </p:handoutMasterIdLst>
   <p:sldIdLst>
     <p:sldId id="283" r:id="rId2"/>
@@ -42,15 +42,19 @@
     <p:sldId id="336" r:id="rId30"/>
     <p:sldId id="332" r:id="rId31"/>
     <p:sldId id="305" r:id="rId32"/>
-    <p:sldId id="309" r:id="rId33"/>
-    <p:sldId id="337" r:id="rId34"/>
-    <p:sldId id="306" r:id="rId35"/>
-    <p:sldId id="327" r:id="rId36"/>
-    <p:sldId id="326" r:id="rId37"/>
-    <p:sldId id="328" r:id="rId38"/>
-    <p:sldId id="307" r:id="rId39"/>
-    <p:sldId id="329" r:id="rId40"/>
-    <p:sldId id="330" r:id="rId41"/>
+    <p:sldId id="338" r:id="rId33"/>
+    <p:sldId id="339" r:id="rId34"/>
+    <p:sldId id="340" r:id="rId35"/>
+    <p:sldId id="341" r:id="rId36"/>
+    <p:sldId id="342" r:id="rId37"/>
+    <p:sldId id="337" r:id="rId38"/>
+    <p:sldId id="306" r:id="rId39"/>
+    <p:sldId id="327" r:id="rId40"/>
+    <p:sldId id="326" r:id="rId41"/>
+    <p:sldId id="328" r:id="rId42"/>
+    <p:sldId id="307" r:id="rId43"/>
+    <p:sldId id="329" r:id="rId44"/>
+    <p:sldId id="330" r:id="rId45"/>
   </p:sldIdLst>
   <p:sldSz cx="9144000" cy="6858000" type="screen4x3"/>
   <p:notesSz cx="7099300" cy="9385300"/>
@@ -1042,7 +1046,7 @@
             <a:fld id="{FE061C16-56D9-455B-A146-2A84C0109F5C}" type="slidenum">
               <a:rPr lang="en-US" altLang="zh-CN" smtClean="0"/>
               <a:pPr/>
-              <a:t>35</a:t>
+              <a:t>39</a:t>
             </a:fld>
             <a:endParaRPr lang="en-US" altLang="zh-CN"/>
           </a:p>
@@ -1127,7 +1131,7 @@
             <a:fld id="{FE061C16-56D9-455B-A146-2A84C0109F5C}" type="slidenum">
               <a:rPr lang="en-US" altLang="zh-CN" smtClean="0"/>
               <a:pPr/>
-              <a:t>37</a:t>
+              <a:t>41</a:t>
             </a:fld>
             <a:endParaRPr lang="en-US" altLang="zh-CN"/>
           </a:p>
@@ -1212,7 +1216,7 @@
             <a:fld id="{FE061C16-56D9-455B-A146-2A84C0109F5C}" type="slidenum">
               <a:rPr lang="en-US" altLang="zh-CN" smtClean="0"/>
               <a:pPr/>
-              <a:t>39</a:t>
+              <a:t>43</a:t>
             </a:fld>
             <a:endParaRPr lang="en-US" altLang="zh-CN"/>
           </a:p>
@@ -1297,7 +1301,7 @@
             <a:fld id="{FE061C16-56D9-455B-A146-2A84C0109F5C}" type="slidenum">
               <a:rPr lang="en-US" altLang="zh-CN" smtClean="0"/>
               <a:pPr/>
-              <a:t>40</a:t>
+              <a:t>44</a:t>
             </a:fld>
             <a:endParaRPr lang="en-US" altLang="zh-CN"/>
           </a:p>
@@ -6529,14 +6533,14 @@
           </a:ln>
           <a:extLst>
             <a:ext uri="{909E8E84-426E-40dd-AFC4-6F175D3DCCD1}">
-              <a14:hiddenFill xmlns:a14="http://schemas.microsoft.com/office/drawing/2010/main" xmlns="">
+              <a14:hiddenFill xmlns="" xmlns:a14="http://schemas.microsoft.com/office/drawing/2010/main">
                 <a:solidFill>
                   <a:schemeClr val="accent1"/>
                 </a:solidFill>
               </a14:hiddenFill>
             </a:ext>
             <a:ext uri="{91240B29-F687-4f45-9708-019B960494DF}">
-              <a14:hiddenLine xmlns:a14="http://schemas.microsoft.com/office/drawing/2010/main" xmlns="" w="9525">
+              <a14:hiddenLine xmlns="" xmlns:a14="http://schemas.microsoft.com/office/drawing/2010/main" w="9525">
                 <a:solidFill>
                   <a:schemeClr val="tx1"/>
                 </a:solidFill>
@@ -6906,6 +6910,35 @@
             <a:r>
               <a:rPr lang="en-US" dirty="0"/>
               <a:t>Sprites</a:t>
+            </a:r>
+          </a:p>
+          <a:p>
+            <a:r>
+              <a:rPr lang="en-US" dirty="0" err="1"/>
+              <a:t>Spritesheets</a:t>
+            </a:r>
+            <a:r>
+              <a:rPr lang="en-US" dirty="0"/>
+              <a:t>, animation, etc.</a:t>
+            </a:r>
+          </a:p>
+          <a:p>
+            <a:r>
+              <a:rPr lang="en-US" dirty="0"/>
+              <a:t>Affine Transforms / moving objects in space</a:t>
+            </a:r>
+          </a:p>
+          <a:p>
+            <a:pPr lvl="1"/>
+            <a:r>
+              <a:rPr lang="en-US" dirty="0"/>
+              <a:t>2D and 3D</a:t>
+            </a:r>
+          </a:p>
+          <a:p>
+            <a:r>
+              <a:rPr lang="en-US" dirty="0"/>
+              <a:t>Coordinate systems</a:t>
             </a:r>
           </a:p>
           <a:p>
@@ -11691,7 +11724,7 @@
           <a:p>
             <a:r>
               <a:rPr lang="en-US" dirty="0"/>
-              <a:t>Beware Transform Order!</a:t>
+              <a:t>What about 3D Games?</a:t>
             </a:r>
           </a:p>
         </p:txBody>
@@ -11706,63 +11739,28 @@
             <p:ph idx="1"/>
           </p:nvPr>
         </p:nvSpPr>
-        <p:spPr>
-          <a:xfrm>
-            <a:off x="381000" y="4572000"/>
-            <a:ext cx="8382000" cy="1524000"/>
-          </a:xfrm>
-        </p:spPr>
+        <p:spPr/>
         <p:txBody>
           <a:bodyPr/>
           <a:lstStyle/>
           <a:p>
-            <a:pPr marL="0" indent="0">
+            <a:r>
+              <a:rPr lang="en-US" dirty="0"/>
+              <a:t>Affine Transforms work in 3D too!!</a:t>
+            </a:r>
+          </a:p>
+          <a:p>
+            <a:pPr lvl="1"/>
+            <a:r>
+              <a:rPr lang="en-US" dirty="0"/>
+              <a:t>Simply add a new row and column:</a:t>
+            </a:r>
+          </a:p>
+          <a:p>
+            <a:pPr marL="457200" lvl="1" indent="0">
               <a:buNone/>
             </a:pPr>
-            <a:r>
-              <a:rPr lang="en-US" dirty="0">
-                <a:solidFill>
-                  <a:srgbClr val="FF0000"/>
-                </a:solidFill>
-              </a:rPr>
-              <a:t>Rotate</a:t>
-            </a:r>
-            <a:r>
-              <a:rPr lang="en-US" dirty="0"/>
-              <a:t> then </a:t>
-            </a:r>
-            <a:r>
-              <a:rPr lang="en-US" dirty="0">
-                <a:solidFill>
-                  <a:srgbClr val="FF3399"/>
-                </a:solidFill>
-              </a:rPr>
-              <a:t>Translate</a:t>
-            </a:r>
-            <a:r>
-              <a:rPr lang="en-US" dirty="0"/>
-              <a:t>		</a:t>
-            </a:r>
-            <a:r>
-              <a:rPr lang="en-US" dirty="0">
-                <a:solidFill>
-                  <a:srgbClr val="FF3399"/>
-                </a:solidFill>
-              </a:rPr>
-              <a:t>Translate</a:t>
-            </a:r>
-            <a:r>
-              <a:rPr lang="en-US" dirty="0"/>
-              <a:t> then </a:t>
-            </a:r>
-            <a:r>
-              <a:rPr lang="en-US" dirty="0">
-                <a:solidFill>
-                  <a:srgbClr val="FF0000"/>
-                </a:solidFill>
-              </a:rPr>
-              <a:t>Rotate</a:t>
-            </a:r>
+            <a:endParaRPr lang="en-US" dirty="0"/>
           </a:p>
         </p:txBody>
       </p:sp>
@@ -11792,62 +11790,38 @@
       </p:sp>
       <p:pic>
         <p:nvPicPr>
-          <p:cNvPr id="15362" name="Picture 2"/>
+          <p:cNvPr id="7" name="Picture 6">
+            <a:extLst>
+              <a:ext uri="{FF2B5EF4-FFF2-40B4-BE49-F238E27FC236}">
+                <a16:creationId xmlns:a16="http://schemas.microsoft.com/office/drawing/2014/main" id="{9A6D6D10-3AEC-8945-B81A-8F3117316C88}"/>
+              </a:ext>
+            </a:extLst>
+          </p:cNvPr>
           <p:cNvPicPr>
-            <a:picLocks noChangeAspect="1" noChangeArrowheads="1"/>
+            <a:picLocks noChangeAspect="1"/>
           </p:cNvPicPr>
           <p:nvPr/>
         </p:nvPicPr>
         <p:blipFill>
-          <a:blip r:embed="rId2">
-            <a:extLst>
-              <a:ext uri="{28A0092B-C50C-407E-A947-70E740481C1C}">
-                <a14:useLocalDpi xmlns:a14="http://schemas.microsoft.com/office/drawing/2010/main" val="0"/>
-              </a:ext>
-            </a:extLst>
-          </a:blip>
-          <a:srcRect/>
+          <a:blip r:embed="rId2"/>
           <a:stretch>
             <a:fillRect/>
           </a:stretch>
         </p:blipFill>
-        <p:spPr bwMode="auto">
+        <p:spPr>
           <a:xfrm>
-            <a:off x="476250" y="1295400"/>
-            <a:ext cx="8191500" cy="3343275"/>
+            <a:off x="1143000" y="2224019"/>
+            <a:ext cx="6858000" cy="3871981"/>
           </a:xfrm>
           <a:prstGeom prst="rect">
             <a:avLst/>
           </a:prstGeom>
-          <a:noFill/>
-          <a:ln>
-            <a:noFill/>
-          </a:ln>
-          <a:extLst>
-            <a:ext uri="{909E8E84-426E-40dd-AFC4-6F175D3DCCD1}">
-              <a14:hiddenFill xmlns:a14="http://schemas.microsoft.com/office/drawing/2010/main" xmlns="">
-                <a:solidFill>
-                  <a:schemeClr val="accent1"/>
-                </a:solidFill>
-              </a14:hiddenFill>
-            </a:ext>
-            <a:ext uri="{91240B29-F687-4f45-9708-019B960494DF}">
-              <a14:hiddenLine xmlns:a14="http://schemas.microsoft.com/office/drawing/2010/main" xmlns="" w="9525">
-                <a:solidFill>
-                  <a:schemeClr val="tx1"/>
-                </a:solidFill>
-                <a:miter lim="800000"/>
-                <a:headEnd/>
-                <a:tailEnd/>
-              </a14:hiddenLine>
-            </a:ext>
-          </a:extLst>
         </p:spPr>
       </p:pic>
     </p:spTree>
     <p:extLst>
       <p:ext uri="{BB962C8B-B14F-4D97-AF65-F5344CB8AC3E}">
-        <p14:creationId xmlns:p14="http://schemas.microsoft.com/office/powerpoint/2010/main" val="1863943127"/>
+        <p14:creationId xmlns:p14="http://schemas.microsoft.com/office/powerpoint/2010/main" val="2875565853"/>
       </p:ext>
     </p:extLst>
   </p:cSld>
@@ -11891,19 +11865,19 @@
           <a:p>
             <a:r>
               <a:rPr lang="en-US" dirty="0"/>
-              <a:t>Animations</a:t>
-            </a:r>
-          </a:p>
-        </p:txBody>
-      </p:sp>
-      <p:sp>
-        <p:nvSpPr>
-          <p:cNvPr id="3" name="Text Placeholder 2"/>
+              <a:t>What about 3D Games?</a:t>
+            </a:r>
+          </a:p>
+        </p:txBody>
+      </p:sp>
+      <p:sp>
+        <p:nvSpPr>
+          <p:cNvPr id="3" name="Content Placeholder 2"/>
           <p:cNvSpPr>
             <a:spLocks noGrp="1"/>
           </p:cNvSpPr>
           <p:nvPr>
-            <p:ph type="body" idx="1"/>
+            <p:ph idx="1"/>
           </p:nvPr>
         </p:nvSpPr>
         <p:spPr/>
@@ -11911,7 +11885,10 @@
           <a:bodyPr/>
           <a:lstStyle/>
           <a:p>
-            <a:endParaRPr lang="en-US" dirty="0"/>
+            <a:r>
+              <a:rPr lang="en-US" dirty="0"/>
+              <a:t>Affine Transforms work in 3D too!!</a:t>
+            </a:r>
           </a:p>
         </p:txBody>
       </p:sp>
@@ -11930,7 +11907,7 @@
           <a:bodyPr/>
           <a:lstStyle/>
           <a:p>
-            <a:fld id="{FA2F35AA-A946-4799-AE91-DFCF9FD1ED3C}" type="slidenum">
+            <a:fld id="{D0357299-C40C-42AB-B0C0-2E6E0A5A7F61}" type="slidenum">
               <a:rPr lang="en-US" altLang="zh-CN" smtClean="0"/>
               <a:pPr/>
               <a:t>33</a:t>
@@ -11939,10 +11916,40 @@
           </a:p>
         </p:txBody>
       </p:sp>
+      <p:pic>
+        <p:nvPicPr>
+          <p:cNvPr id="6" name="Picture 5">
+            <a:extLst>
+              <a:ext uri="{FF2B5EF4-FFF2-40B4-BE49-F238E27FC236}">
+                <a16:creationId xmlns:a16="http://schemas.microsoft.com/office/drawing/2014/main" id="{D51DB12B-F079-3E42-B04B-B6AFF85E2B1D}"/>
+              </a:ext>
+            </a:extLst>
+          </p:cNvPr>
+          <p:cNvPicPr>
+            <a:picLocks noChangeAspect="1"/>
+          </p:cNvPicPr>
+          <p:nvPr/>
+        </p:nvPicPr>
+        <p:blipFill>
+          <a:blip r:embed="rId2"/>
+          <a:stretch>
+            <a:fillRect/>
+          </a:stretch>
+        </p:blipFill>
+        <p:spPr>
+          <a:xfrm>
+            <a:off x="1905000" y="1752600"/>
+            <a:ext cx="5562600" cy="4140200"/>
+          </a:xfrm>
+          <a:prstGeom prst="rect">
+            <a:avLst/>
+          </a:prstGeom>
+        </p:spPr>
+      </p:pic>
     </p:spTree>
     <p:extLst>
       <p:ext uri="{BB962C8B-B14F-4D97-AF65-F5344CB8AC3E}">
-        <p14:creationId xmlns:p14="http://schemas.microsoft.com/office/powerpoint/2010/main" val="1347107443"/>
+        <p14:creationId xmlns:p14="http://schemas.microsoft.com/office/powerpoint/2010/main" val="1776626562"/>
       </p:ext>
     </p:extLst>
   </p:cSld>
@@ -11986,7 +11993,7 @@
           <a:p>
             <a:r>
               <a:rPr lang="en-US" dirty="0"/>
-              <a:t>Animation</a:t>
+              <a:t>What about 3D Games?</a:t>
             </a:r>
           </a:p>
         </p:txBody>
@@ -12008,38 +12015,33 @@
           <a:p>
             <a:r>
               <a:rPr lang="en-US" dirty="0"/>
-              <a:t>An animation is simply a Sprite that has multiple images that cycle through.</a:t>
-            </a:r>
-          </a:p>
-          <a:p>
-            <a:endParaRPr lang="en-US" dirty="0"/>
-          </a:p>
-          <a:p>
+              <a:t>BEWARE! Rotations in 3D are very finnicky because the ORDER of the rotations matter.</a:t>
+            </a:r>
+          </a:p>
+          <a:p>
+            <a:pPr lvl="1"/>
+            <a:r>
+              <a:rPr lang="en-US" b="1" dirty="0"/>
+              <a:t>Euler’s rotation theorem</a:t>
+            </a:r>
             <a:r>
               <a:rPr lang="en-US" dirty="0"/>
-              <a:t>So, we might have a new class:</a:t>
-            </a:r>
-          </a:p>
-          <a:p>
-            <a:endParaRPr lang="en-US" dirty="0"/>
-          </a:p>
-          <a:p>
-            <a:pPr marL="0" indent="0">
-              <a:buNone/>
-            </a:pPr>
-            <a:endParaRPr lang="en-US" dirty="0"/>
-          </a:p>
-          <a:p>
-            <a:pPr marL="0" indent="0">
-              <a:buNone/>
-            </a:pPr>
-            <a:r>
-              <a:rPr lang="en-US" dirty="0" err="1"/>
-              <a:t>AnimatedSprite</a:t>
-            </a:r>
+              <a:t>: Any rotation of a 3D object can be broken down into three rotations (one along each axis). Also states that any configuration is one rotation around some axis.</a:t>
+            </a:r>
+          </a:p>
+          <a:p>
+            <a:pPr lvl="1"/>
             <a:r>
               <a:rPr lang="en-US" dirty="0"/>
-              <a:t> extends Sprite</a:t>
+              <a:t>However, when using </a:t>
+            </a:r>
+            <a:r>
+              <a:rPr lang="en-US" b="1" dirty="0"/>
+              <a:t>Affine Transforms</a:t>
+            </a:r>
+            <a:r>
+              <a:rPr lang="en-US" dirty="0"/>
+              <a:t>, the order in which. We multiply the three rotations can affect the outcome.</a:t>
             </a:r>
           </a:p>
         </p:txBody>
@@ -12071,7 +12073,7 @@
     </p:spTree>
     <p:extLst>
       <p:ext uri="{BB962C8B-B14F-4D97-AF65-F5344CB8AC3E}">
-        <p14:creationId xmlns:p14="http://schemas.microsoft.com/office/powerpoint/2010/main" val="2165692892"/>
+        <p14:creationId xmlns:p14="http://schemas.microsoft.com/office/powerpoint/2010/main" val="861186227"/>
       </p:ext>
     </p:extLst>
   </p:cSld>
@@ -12114,133 +12116,68 @@
           <a:lstStyle/>
           <a:p>
             <a:r>
-              <a:rPr lang="en-US" dirty="0" err="1"/>
-              <a:t>AnimatedSprite</a:t>
+              <a:rPr lang="en-US" dirty="0"/>
+              <a:t>What about 3D Games?</a:t>
+            </a:r>
+          </a:p>
+        </p:txBody>
+      </p:sp>
+      <p:sp>
+        <p:nvSpPr>
+          <p:cNvPr id="3" name="Content Placeholder 2"/>
+          <p:cNvSpPr>
+            <a:spLocks noGrp="1"/>
+          </p:cNvSpPr>
+          <p:nvPr>
+            <p:ph idx="1"/>
+          </p:nvPr>
+        </p:nvSpPr>
+        <p:spPr/>
+        <p:txBody>
+          <a:bodyPr/>
+          <a:lstStyle/>
+          <a:p>
+            <a:r>
+              <a:rPr lang="en-US" dirty="0"/>
+              <a:t>Gimbal Lock:</a:t>
+            </a:r>
+          </a:p>
+          <a:p>
+            <a:pPr lvl="1"/>
+            <a:r>
+              <a:rPr lang="en-US" dirty="0"/>
+              <a:t>A situation in which one rotation causes two of the other rotation axes to become aligned.</a:t>
+            </a:r>
+          </a:p>
+          <a:p>
+            <a:pPr lvl="1"/>
+            <a:r>
+              <a:rPr lang="en-US" dirty="0">
+                <a:hlinkClick r:id="rId2"/>
+              </a:rPr>
+              <a:t>https://en.wikipedia.org/wiki/Gimbal_lock</a:t>
             </a:r>
             <a:endParaRPr lang="en-US" dirty="0"/>
           </a:p>
-        </p:txBody>
-      </p:sp>
-      <p:sp>
-        <p:nvSpPr>
-          <p:cNvPr id="3" name="Content Placeholder 2"/>
-          <p:cNvSpPr>
-            <a:spLocks noGrp="1"/>
-          </p:cNvSpPr>
-          <p:nvPr>
-            <p:ph idx="1"/>
-          </p:nvPr>
-        </p:nvSpPr>
-        <p:spPr/>
-        <p:txBody>
-          <a:bodyPr/>
-          <a:lstStyle/>
-          <a:p>
-            <a:r>
-              <a:rPr lang="en-US" sz="2400" dirty="0" err="1"/>
-              <a:t>AnimatedSprite</a:t>
-            </a:r>
-            <a:r>
-              <a:rPr lang="en-US" sz="2400" dirty="0"/>
-              <a:t> should contain:</a:t>
-            </a:r>
-          </a:p>
           <a:p>
             <a:pPr lvl="1"/>
             <a:r>
-              <a:rPr lang="en-US" sz="2400" b="1" i="1" dirty="0"/>
-              <a:t>Playing</a:t>
-            </a:r>
-            <a:r>
-              <a:rPr lang="en-US" sz="2400" dirty="0"/>
-              <a:t>: true </a:t>
-            </a:r>
-            <a:r>
-              <a:rPr lang="en-US" sz="2400" dirty="0" err="1"/>
-              <a:t>iff</a:t>
-            </a:r>
-            <a:r>
-              <a:rPr lang="en-US" sz="2400" dirty="0"/>
-              <a:t> this animation is currently playing</a:t>
+              <a:rPr lang="en-US" dirty="0"/>
+              <a:t>Is unavoidable when you have a set rotation multiply order.</a:t>
+            </a:r>
+          </a:p>
+          <a:p>
+            <a:pPr lvl="2"/>
+            <a:r>
+              <a:rPr lang="en-US" dirty="0"/>
+              <a:t>Unity uses y-rotation, then x, then z</a:t>
             </a:r>
           </a:p>
           <a:p>
             <a:pPr lvl="1"/>
             <a:r>
-              <a:rPr lang="en-US" sz="2400" b="1" i="1" dirty="0"/>
-              <a:t>Frames</a:t>
-            </a:r>
-            <a:r>
-              <a:rPr lang="en-US" sz="2400" dirty="0"/>
-              <a:t>: List of images of all of the frames</a:t>
-            </a:r>
-          </a:p>
-          <a:p>
-            <a:pPr lvl="1"/>
-            <a:r>
-              <a:rPr lang="en-US" sz="2400" b="1" i="1" dirty="0" err="1"/>
-              <a:t>currentFrame</a:t>
-            </a:r>
-            <a:r>
-              <a:rPr lang="en-US" sz="2400" b="1" i="1" dirty="0"/>
-              <a:t>/</a:t>
-            </a:r>
-            <a:r>
-              <a:rPr lang="en-US" sz="2400" b="1" i="1" dirty="0" err="1"/>
-              <a:t>startFrame</a:t>
-            </a:r>
-            <a:r>
-              <a:rPr lang="en-US" sz="2400" b="1" i="1" dirty="0"/>
-              <a:t>/</a:t>
-            </a:r>
-            <a:r>
-              <a:rPr lang="en-US" sz="2400" b="1" i="1" dirty="0" err="1"/>
-              <a:t>endFrame</a:t>
-            </a:r>
-            <a:r>
-              <a:rPr lang="en-US" sz="2400" dirty="0"/>
-              <a:t>: indices for which frame is playing, etc.</a:t>
-            </a:r>
-          </a:p>
-          <a:p>
-            <a:pPr lvl="1"/>
-            <a:r>
-              <a:rPr lang="en-US" sz="2400" b="1" i="1" dirty="0" err="1"/>
-              <a:t>animationSpeed</a:t>
-            </a:r>
-            <a:r>
-              <a:rPr lang="en-US" sz="2400" dirty="0"/>
-              <a:t>: How fast/often the frames switch</a:t>
-            </a:r>
-          </a:p>
-          <a:p>
-            <a:pPr lvl="1"/>
-            <a:r>
-              <a:rPr lang="en-US" sz="2400" dirty="0"/>
-              <a:t>Anything else?</a:t>
-            </a:r>
-          </a:p>
-          <a:p>
-            <a:pPr lvl="1"/>
-            <a:r>
-              <a:rPr lang="en-US" sz="2400" dirty="0"/>
-              <a:t>Remember this extends Sprite, so already has that functionality. </a:t>
-            </a:r>
-            <a:r>
-              <a:rPr lang="en-US" sz="2400" dirty="0" err="1"/>
-              <a:t>DisplayObject</a:t>
-            </a:r>
-            <a:r>
-              <a:rPr lang="en-US" sz="2400" dirty="0"/>
-              <a:t> will need a </a:t>
-            </a:r>
-            <a:r>
-              <a:rPr lang="en-US" sz="2400" dirty="0" err="1"/>
-              <a:t>setImage</a:t>
-            </a:r>
-            <a:r>
-              <a:rPr lang="en-US" sz="2400" dirty="0"/>
-              <a:t>() method that allows us to switch the image of this sprite.</a:t>
+              <a:rPr lang="en-US" dirty="0"/>
+              <a:t>You can “FIX” Gimbal Locks by altering the multiply order on the fly, but very cumbersome and difficult to implement.</a:t>
             </a:r>
           </a:p>
         </p:txBody>
@@ -12272,7 +12209,7 @@
     </p:spTree>
     <p:extLst>
       <p:ext uri="{BB962C8B-B14F-4D97-AF65-F5344CB8AC3E}">
-        <p14:creationId xmlns:p14="http://schemas.microsoft.com/office/powerpoint/2010/main" val="765557030"/>
+        <p14:creationId xmlns:p14="http://schemas.microsoft.com/office/powerpoint/2010/main" val="338554689"/>
       </p:ext>
     </p:extLst>
   </p:cSld>
@@ -12315,360 +12252,66 @@
           <a:lstStyle/>
           <a:p>
             <a:r>
-              <a:rPr lang="en-US" dirty="0" err="1"/>
-              <a:t>AnimatedSprite</a:t>
-            </a:r>
-            <a:r>
               <a:rPr lang="en-US" dirty="0"/>
-              <a:t> </a:t>
-            </a:r>
-            <a:r>
-              <a:rPr lang="en-US" dirty="0" err="1"/>
-              <a:t>Psuedo</a:t>
-            </a:r>
+              <a:t>What about 3D Games?</a:t>
+            </a:r>
+          </a:p>
+        </p:txBody>
+      </p:sp>
+      <p:sp>
+        <p:nvSpPr>
+          <p:cNvPr id="3" name="Content Placeholder 2"/>
+          <p:cNvSpPr>
+            <a:spLocks noGrp="1"/>
+          </p:cNvSpPr>
+          <p:nvPr>
+            <p:ph idx="1"/>
+          </p:nvPr>
+        </p:nvSpPr>
+        <p:spPr/>
+        <p:txBody>
+          <a:bodyPr/>
+          <a:lstStyle/>
+          <a:p>
             <a:r>
               <a:rPr lang="en-US" dirty="0"/>
-              <a:t>-code</a:t>
-            </a:r>
-          </a:p>
-        </p:txBody>
-      </p:sp>
-      <p:sp>
-        <p:nvSpPr>
-          <p:cNvPr id="3" name="Content Placeholder 2"/>
-          <p:cNvSpPr>
-            <a:spLocks noGrp="1"/>
-          </p:cNvSpPr>
-          <p:nvPr>
-            <p:ph idx="1"/>
-          </p:nvPr>
-        </p:nvSpPr>
-        <p:spPr/>
-        <p:txBody>
-          <a:bodyPr/>
-          <a:lstStyle/>
-          <a:p>
-            <a:pPr marL="0" indent="0">
-              <a:buNone/>
-            </a:pPr>
-            <a:r>
-              <a:rPr lang="en-US" sz="1400" dirty="0">
-                <a:latin typeface="Courier New"/>
-                <a:cs typeface="Courier New"/>
-              </a:rPr>
-              <a:t>/*NOTICE THIS IS JAVA-LIKE, BUT NOT EXACTLY VALID JAVA*/</a:t>
-            </a:r>
-          </a:p>
-          <a:p>
-            <a:pPr marL="0" indent="0">
-              <a:buNone/>
-            </a:pPr>
-            <a:endParaRPr lang="en-US" sz="1400" dirty="0">
-              <a:latin typeface="Courier New"/>
-              <a:cs typeface="Courier New"/>
-            </a:endParaRPr>
-          </a:p>
-          <a:p>
-            <a:pPr marL="0" indent="0">
-              <a:buNone/>
-            </a:pPr>
-            <a:r>
-              <a:rPr lang="en-US" sz="1400" dirty="0">
-                <a:latin typeface="Courier New"/>
-                <a:cs typeface="Courier New"/>
-              </a:rPr>
-              <a:t>protected override void Update(){</a:t>
-            </a:r>
-          </a:p>
-          <a:p>
-            <a:pPr marL="0" indent="0">
-              <a:buNone/>
-            </a:pPr>
-            <a:r>
-              <a:rPr lang="en-US" sz="1400" dirty="0">
-                <a:latin typeface="Courier New"/>
-                <a:cs typeface="Courier New"/>
-              </a:rPr>
-              <a:t>    if(playing){</a:t>
-            </a:r>
-          </a:p>
-          <a:p>
-            <a:pPr marL="0" indent="0">
-              <a:buNone/>
-            </a:pPr>
-            <a:r>
-              <a:rPr lang="en-US" sz="1400" dirty="0">
-                <a:latin typeface="Courier New"/>
-                <a:cs typeface="Courier New"/>
-              </a:rPr>
-              <a:t>        if(</a:t>
-            </a:r>
-            <a:r>
-              <a:rPr lang="en-US" sz="1400" dirty="0" err="1">
-                <a:latin typeface="Courier New"/>
-                <a:cs typeface="Courier New"/>
-              </a:rPr>
-              <a:t>clock.elapsedTime</a:t>
-            </a:r>
-            <a:r>
-              <a:rPr lang="en-US" sz="1400" dirty="0">
-                <a:latin typeface="Courier New"/>
-                <a:cs typeface="Courier New"/>
-              </a:rPr>
-              <a:t> &gt;= </a:t>
-            </a:r>
-            <a:r>
-              <a:rPr lang="en-US" sz="1400" dirty="0" err="1">
-                <a:latin typeface="Courier New"/>
-                <a:cs typeface="Courier New"/>
-              </a:rPr>
-              <a:t>animationSpeed</a:t>
-            </a:r>
-            <a:r>
-              <a:rPr lang="en-US" sz="1400" dirty="0">
-                <a:latin typeface="Courier New"/>
-                <a:cs typeface="Courier New"/>
-              </a:rPr>
-              <a:t>){</a:t>
-            </a:r>
-          </a:p>
-          <a:p>
-            <a:pPr marL="0" indent="0">
-              <a:buNone/>
-            </a:pPr>
-            <a:r>
-              <a:rPr lang="en-US" sz="1400" dirty="0">
-                <a:latin typeface="Courier New"/>
-                <a:cs typeface="Courier New"/>
-              </a:rPr>
-              <a:t>            </a:t>
-            </a:r>
-            <a:r>
-              <a:rPr lang="en-US" sz="1400" dirty="0" err="1">
-                <a:latin typeface="Courier New"/>
-                <a:cs typeface="Courier New"/>
-              </a:rPr>
-              <a:t>currentFrame</a:t>
-            </a:r>
-            <a:r>
-              <a:rPr lang="en-US" sz="1400" dirty="0">
-                <a:latin typeface="Courier New"/>
-                <a:cs typeface="Courier New"/>
-              </a:rPr>
-              <a:t>++; //need </a:t>
-            </a:r>
-            <a:r>
-              <a:rPr lang="en-US" sz="1400" dirty="0" err="1">
-                <a:latin typeface="Courier New"/>
-                <a:cs typeface="Courier New"/>
-              </a:rPr>
-              <a:t>currentFrame</a:t>
-            </a:r>
-            <a:r>
-              <a:rPr lang="en-US" sz="1400" dirty="0">
-                <a:latin typeface="Courier New"/>
-                <a:cs typeface="Courier New"/>
-              </a:rPr>
-              <a:t> to wrap, so this is buggy</a:t>
-            </a:r>
-          </a:p>
-          <a:p>
-            <a:pPr marL="0" indent="0">
-              <a:buNone/>
-            </a:pPr>
-            <a:r>
-              <a:rPr lang="en-US" sz="1400" dirty="0">
-                <a:latin typeface="Courier New"/>
-                <a:cs typeface="Courier New"/>
-              </a:rPr>
-              <a:t>            </a:t>
-            </a:r>
-            <a:r>
-              <a:rPr lang="en-US" sz="1400" dirty="0" err="1">
-                <a:latin typeface="Courier New"/>
-                <a:cs typeface="Courier New"/>
-              </a:rPr>
-              <a:t>super.setImage</a:t>
-            </a:r>
-            <a:r>
-              <a:rPr lang="en-US" sz="1400" dirty="0">
-                <a:latin typeface="Courier New"/>
-                <a:cs typeface="Courier New"/>
-              </a:rPr>
-              <a:t>(</a:t>
-            </a:r>
-            <a:r>
-              <a:rPr lang="en-US" sz="1400" dirty="0" err="1">
-                <a:latin typeface="Courier New"/>
-                <a:cs typeface="Courier New"/>
-              </a:rPr>
-              <a:t>frames.get</a:t>
-            </a:r>
-            <a:r>
-              <a:rPr lang="en-US" sz="1400" dirty="0">
-                <a:latin typeface="Courier New"/>
-                <a:cs typeface="Courier New"/>
-              </a:rPr>
-              <a:t>(</a:t>
-            </a:r>
-            <a:r>
-              <a:rPr lang="en-US" sz="1400" dirty="0" err="1">
-                <a:latin typeface="Courier New"/>
-                <a:cs typeface="Courier New"/>
-              </a:rPr>
-              <a:t>currentFrame</a:t>
-            </a:r>
-            <a:r>
-              <a:rPr lang="en-US" sz="1400" dirty="0">
-                <a:latin typeface="Courier New"/>
-                <a:cs typeface="Courier New"/>
-              </a:rPr>
-              <a:t>));</a:t>
-            </a:r>
-          </a:p>
-          <a:p>
-            <a:pPr marL="0" indent="0">
-              <a:buNone/>
-            </a:pPr>
-            <a:r>
-              <a:rPr lang="en-US" sz="1400" dirty="0">
-                <a:latin typeface="Courier New"/>
-                <a:cs typeface="Courier New"/>
-              </a:rPr>
-              <a:t>        }</a:t>
-            </a:r>
-          </a:p>
-          <a:p>
-            <a:pPr marL="0" indent="0">
-              <a:buNone/>
-            </a:pPr>
-            <a:r>
-              <a:rPr lang="en-US" sz="1400" dirty="0">
-                <a:latin typeface="Courier New"/>
-                <a:cs typeface="Courier New"/>
-              </a:rPr>
-              <a:t>    }</a:t>
-            </a:r>
-          </a:p>
-          <a:p>
-            <a:pPr marL="0" indent="0">
-              <a:buNone/>
-            </a:pPr>
-            <a:r>
-              <a:rPr lang="en-US" sz="1400" dirty="0">
-                <a:latin typeface="Courier New"/>
-                <a:cs typeface="Courier New"/>
-              </a:rPr>
-              <a:t>}</a:t>
-            </a:r>
-          </a:p>
-          <a:p>
-            <a:pPr marL="0" indent="0">
-              <a:buNone/>
-            </a:pPr>
-            <a:endParaRPr lang="en-US" sz="1400" dirty="0">
-              <a:latin typeface="Courier New"/>
-              <a:cs typeface="Courier New"/>
-            </a:endParaRPr>
-          </a:p>
-          <a:p>
-            <a:pPr marL="0" indent="0">
-              <a:buNone/>
-            </a:pPr>
-            <a:r>
-              <a:rPr lang="en-US" sz="1400" dirty="0">
-                <a:latin typeface="Courier New"/>
-                <a:cs typeface="Courier New"/>
-              </a:rPr>
-              <a:t>/* Notice that draw does not need to do anything differently */</a:t>
-            </a:r>
-          </a:p>
-          <a:p>
-            <a:pPr marL="0" indent="0">
-              <a:buNone/>
-            </a:pPr>
-            <a:r>
-              <a:rPr lang="en-US" sz="1400" dirty="0">
-                <a:latin typeface="Courier New"/>
-                <a:cs typeface="Courier New"/>
-              </a:rPr>
-              <a:t>protected override void Draw(Graphics g)</a:t>
-            </a:r>
-          </a:p>
-          <a:p>
-            <a:pPr marL="0" indent="0">
-              <a:buNone/>
-            </a:pPr>
-            <a:r>
-              <a:rPr lang="en-US" sz="1400" dirty="0">
-                <a:latin typeface="Courier New"/>
-                <a:cs typeface="Courier New"/>
-              </a:rPr>
-              <a:t>{</a:t>
-            </a:r>
-          </a:p>
-          <a:p>
-            <a:pPr marL="0" indent="0">
-              <a:buNone/>
-            </a:pPr>
-            <a:r>
-              <a:rPr lang="en-US" sz="1400" dirty="0">
-                <a:latin typeface="Courier New"/>
-                <a:cs typeface="Courier New"/>
-              </a:rPr>
-              <a:t>    /* Call the super draw method in </a:t>
-            </a:r>
-            <a:r>
-              <a:rPr lang="en-US" sz="1400" dirty="0" err="1">
-                <a:latin typeface="Courier New"/>
-                <a:cs typeface="Courier New"/>
-              </a:rPr>
-              <a:t>DisplayObject</a:t>
-            </a:r>
-            <a:r>
-              <a:rPr lang="en-US" sz="1400" dirty="0">
-                <a:latin typeface="Courier New"/>
-                <a:cs typeface="Courier New"/>
-              </a:rPr>
-              <a:t> class */</a:t>
-            </a:r>
-          </a:p>
-          <a:p>
-            <a:pPr marL="0" indent="0">
-              <a:buNone/>
-            </a:pPr>
-            <a:r>
-              <a:rPr lang="en-US" sz="1400" dirty="0">
-                <a:latin typeface="Courier New"/>
-                <a:cs typeface="Courier New"/>
-              </a:rPr>
-              <a:t>    </a:t>
-            </a:r>
-            <a:r>
-              <a:rPr lang="en-US" sz="1400" dirty="0" err="1">
-                <a:latin typeface="Courier New"/>
-                <a:cs typeface="Courier New"/>
-              </a:rPr>
-              <a:t>super.draw</a:t>
-            </a:r>
-            <a:r>
-              <a:rPr lang="en-US" sz="1400" dirty="0">
-                <a:latin typeface="Courier New"/>
-                <a:cs typeface="Courier New"/>
-              </a:rPr>
-              <a:t>(g);</a:t>
-            </a:r>
-          </a:p>
-          <a:p>
-            <a:pPr marL="0" indent="0">
-              <a:buNone/>
-            </a:pPr>
-            <a:r>
-              <a:rPr lang="en-US" sz="1400" dirty="0">
-                <a:latin typeface="Courier New"/>
-                <a:cs typeface="Courier New"/>
-              </a:rPr>
-              <a:t>}</a:t>
+              <a:t>Gimbal Lock:</a:t>
+            </a:r>
+          </a:p>
+          <a:p>
+            <a:pPr lvl="1"/>
+            <a:r>
+              <a:rPr lang="en-US" dirty="0"/>
+              <a:t>How to avoid?</a:t>
+            </a:r>
+          </a:p>
+          <a:p>
+            <a:pPr lvl="1"/>
+            <a:r>
+              <a:rPr lang="en-US" dirty="0"/>
+              <a:t>If using affine transforms, unavoidable. Best to know about them and consider rotations carefully</a:t>
+            </a:r>
+          </a:p>
+          <a:p>
+            <a:pPr lvl="1"/>
+            <a:r>
+              <a:rPr lang="en-US" dirty="0"/>
+              <a:t>Or…you can use </a:t>
+            </a:r>
+            <a:r>
+              <a:rPr lang="en-US" b="1" i="1" u="sng" dirty="0"/>
+              <a:t>Quaternions</a:t>
+            </a:r>
+            <a:r>
+              <a:rPr lang="en-US" dirty="0"/>
+              <a:t>. A rotation scheme that uses a complex number coordinate space. </a:t>
+            </a:r>
+          </a:p>
+          <a:p>
+            <a:pPr lvl="2"/>
+            <a:r>
+              <a:rPr lang="en-US" dirty="0"/>
+              <a:t>We won’t go over these today.</a:t>
             </a:r>
           </a:p>
         </p:txBody>
@@ -12700,7 +12343,7 @@
     </p:spTree>
     <p:extLst>
       <p:ext uri="{BB962C8B-B14F-4D97-AF65-F5344CB8AC3E}">
-        <p14:creationId xmlns:p14="http://schemas.microsoft.com/office/powerpoint/2010/main" val="3000868790"/>
+        <p14:creationId xmlns:p14="http://schemas.microsoft.com/office/powerpoint/2010/main" val="4027083293"/>
       </p:ext>
     </p:extLst>
   </p:cSld>
@@ -12743,24 +12386,20 @@
           <a:lstStyle/>
           <a:p>
             <a:r>
-              <a:rPr lang="en-US" dirty="0" err="1"/>
-              <a:t>AnimatedSprite</a:t>
-            </a:r>
-            <a:r>
               <a:rPr lang="en-US" dirty="0"/>
-              <a:t>: Different Animations</a:t>
-            </a:r>
-          </a:p>
-        </p:txBody>
-      </p:sp>
-      <p:sp>
-        <p:nvSpPr>
-          <p:cNvPr id="3" name="Content Placeholder 2"/>
+              <a:t>Animations</a:t>
+            </a:r>
+          </a:p>
+        </p:txBody>
+      </p:sp>
+      <p:sp>
+        <p:nvSpPr>
+          <p:cNvPr id="3" name="Text Placeholder 2"/>
           <p:cNvSpPr>
             <a:spLocks noGrp="1"/>
           </p:cNvSpPr>
           <p:nvPr>
-            <p:ph idx="1"/>
+            <p:ph type="body" idx="1"/>
           </p:nvPr>
         </p:nvSpPr>
         <p:spPr/>
@@ -12768,75 +12407,7 @@
           <a:bodyPr/>
           <a:lstStyle/>
           <a:p>
-            <a:r>
-              <a:rPr lang="en-US" sz="2400" dirty="0"/>
-              <a:t>Sometimes, an </a:t>
-            </a:r>
-            <a:r>
-              <a:rPr lang="en-US" sz="2400" dirty="0" err="1"/>
-              <a:t>AnimatedSprite</a:t>
-            </a:r>
-            <a:r>
-              <a:rPr lang="en-US" sz="2400" dirty="0"/>
-              <a:t> should contain different types of animations</a:t>
-            </a:r>
-          </a:p>
-          <a:p>
-            <a:pPr lvl="1"/>
-            <a:r>
-              <a:rPr lang="en-US" sz="2000" dirty="0"/>
-              <a:t>E.g., a walking animation and a jumping animation.</a:t>
-            </a:r>
-          </a:p>
-          <a:p>
-            <a:pPr lvl="1"/>
-            <a:r>
-              <a:rPr lang="en-US" sz="2000" dirty="0"/>
-              <a:t>Thus, you class should support this. I should be able to say:</a:t>
-            </a:r>
-          </a:p>
-          <a:p>
-            <a:pPr lvl="2"/>
-            <a:r>
-              <a:rPr lang="en-US" sz="1600" dirty="0" err="1"/>
-              <a:t>Object.setAnimation</a:t>
-            </a:r>
-            <a:r>
-              <a:rPr lang="en-US" sz="1600" dirty="0"/>
-              <a:t>(“jumping”)</a:t>
-            </a:r>
-          </a:p>
-          <a:p>
-            <a:pPr lvl="2"/>
-            <a:r>
-              <a:rPr lang="en-US" sz="1600" dirty="0" err="1"/>
-              <a:t>Object.play</a:t>
-            </a:r>
-            <a:r>
-              <a:rPr lang="en-US" sz="1600" dirty="0"/>
-              <a:t>()</a:t>
-            </a:r>
-          </a:p>
-          <a:p>
-            <a:pPr lvl="1"/>
-            <a:r>
-              <a:rPr lang="en-US" sz="2000" dirty="0"/>
-              <a:t>…and have the jump animation play.</a:t>
-            </a:r>
-          </a:p>
-          <a:p>
-            <a:pPr lvl="2"/>
-            <a:r>
-              <a:rPr lang="en-US" sz="1600" dirty="0"/>
-              <a:t>How might this work in code?</a:t>
-            </a:r>
-          </a:p>
-          <a:p>
-            <a:pPr lvl="2"/>
-            <a:r>
-              <a:rPr lang="en-US" sz="1600" dirty="0"/>
-              <a:t>Let’s discuss? There are several ways we could implement this.</a:t>
-            </a:r>
+            <a:endParaRPr lang="en-US" dirty="0"/>
           </a:p>
         </p:txBody>
       </p:sp>
@@ -12855,7 +12426,7 @@
           <a:bodyPr/>
           <a:lstStyle/>
           <a:p>
-            <a:fld id="{D0357299-C40C-42AB-B0C0-2E6E0A5A7F61}" type="slidenum">
+            <a:fld id="{FA2F35AA-A946-4799-AE91-DFCF9FD1ED3C}" type="slidenum">
               <a:rPr lang="en-US" altLang="zh-CN" smtClean="0"/>
               <a:pPr/>
               <a:t>37</a:t>
@@ -12867,7 +12438,7 @@
     </p:spTree>
     <p:extLst>
       <p:ext uri="{BB962C8B-B14F-4D97-AF65-F5344CB8AC3E}">
-        <p14:creationId xmlns:p14="http://schemas.microsoft.com/office/powerpoint/2010/main" val="1864089032"/>
+        <p14:creationId xmlns:p14="http://schemas.microsoft.com/office/powerpoint/2010/main" val="1347107443"/>
       </p:ext>
     </p:extLst>
   </p:cSld>
@@ -12911,7 +12482,7 @@
           <a:p>
             <a:r>
               <a:rPr lang="en-US" dirty="0"/>
-              <a:t>Sprite Sheets</a:t>
+              <a:t>Animation</a:t>
             </a:r>
           </a:p>
         </p:txBody>
@@ -12931,7 +12502,41 @@
           <a:bodyPr/>
           <a:lstStyle/>
           <a:p>
+            <a:r>
+              <a:rPr lang="en-US" dirty="0"/>
+              <a:t>An animation is simply a Sprite that has multiple images that cycle through.</a:t>
+            </a:r>
+          </a:p>
+          <a:p>
             <a:endParaRPr lang="en-US" dirty="0"/>
+          </a:p>
+          <a:p>
+            <a:r>
+              <a:rPr lang="en-US" dirty="0"/>
+              <a:t>So, we might have a new class:</a:t>
+            </a:r>
+          </a:p>
+          <a:p>
+            <a:endParaRPr lang="en-US" dirty="0"/>
+          </a:p>
+          <a:p>
+            <a:pPr marL="0" indent="0">
+              <a:buNone/>
+            </a:pPr>
+            <a:endParaRPr lang="en-US" dirty="0"/>
+          </a:p>
+          <a:p>
+            <a:pPr marL="0" indent="0">
+              <a:buNone/>
+            </a:pPr>
+            <a:r>
+              <a:rPr lang="en-US" dirty="0" err="1"/>
+              <a:t>AnimatedSprite</a:t>
+            </a:r>
+            <a:r>
+              <a:rPr lang="en-US" dirty="0"/>
+              <a:t> extends Sprite</a:t>
+            </a:r>
           </a:p>
         </p:txBody>
       </p:sp>
@@ -12959,40 +12564,10 @@
           </a:p>
         </p:txBody>
       </p:sp>
-      <p:pic>
-        <p:nvPicPr>
-          <p:cNvPr id="5" name="Picture 4" descr="runningGrant.png"/>
-          <p:cNvPicPr>
-            <a:picLocks noChangeAspect="1"/>
-          </p:cNvPicPr>
-          <p:nvPr/>
-        </p:nvPicPr>
-        <p:blipFill>
-          <a:blip r:embed="rId2">
-            <a:extLst>
-              <a:ext uri="{28A0092B-C50C-407E-A947-70E740481C1C}">
-                <a14:useLocalDpi xmlns:a14="http://schemas.microsoft.com/office/drawing/2010/main" val="0"/>
-              </a:ext>
-            </a:extLst>
-          </a:blip>
-          <a:stretch>
-            <a:fillRect/>
-          </a:stretch>
-        </p:blipFill>
-        <p:spPr>
-          <a:xfrm>
-            <a:off x="1905000" y="1143000"/>
-            <a:ext cx="5486400" cy="5486400"/>
-          </a:xfrm>
-          <a:prstGeom prst="rect">
-            <a:avLst/>
-          </a:prstGeom>
-        </p:spPr>
-      </p:pic>
     </p:spTree>
     <p:extLst>
       <p:ext uri="{BB962C8B-B14F-4D97-AF65-F5344CB8AC3E}">
-        <p14:creationId xmlns:p14="http://schemas.microsoft.com/office/powerpoint/2010/main" val="3116034986"/>
+        <p14:creationId xmlns:p14="http://schemas.microsoft.com/office/powerpoint/2010/main" val="2165692892"/>
       </p:ext>
     </p:extLst>
   </p:cSld>
@@ -13035,9 +12610,10 @@
           <a:lstStyle/>
           <a:p>
             <a:r>
-              <a:rPr lang="en-US" dirty="0"/>
-              <a:t>Sprite Sheets</a:t>
-            </a:r>
+              <a:rPr lang="en-US" dirty="0" err="1"/>
+              <a:t>AnimatedSprite</a:t>
+            </a:r>
+            <a:endParaRPr lang="en-US" dirty="0"/>
           </a:p>
         </p:txBody>
       </p:sp>
@@ -13051,71 +12627,116 @@
             <p:ph idx="1"/>
           </p:nvPr>
         </p:nvSpPr>
-        <p:spPr>
-          <a:xfrm>
-            <a:off x="381000" y="1143000"/>
-            <a:ext cx="4343400" cy="4876800"/>
-          </a:xfrm>
-        </p:spPr>
+        <p:spPr/>
         <p:txBody>
           <a:bodyPr/>
           <a:lstStyle/>
           <a:p>
             <a:r>
-              <a:rPr lang="en-US" sz="2000" dirty="0"/>
-              <a:t>Sprite sheets always come paired with an xml document.</a:t>
+              <a:rPr lang="en-US" sz="2400" dirty="0" err="1"/>
+              <a:t>AnimatedSprite</a:t>
+            </a:r>
+            <a:r>
+              <a:rPr lang="en-US" sz="2400" dirty="0"/>
+              <a:t> should contain:</a:t>
             </a:r>
           </a:p>
           <a:p>
             <a:pPr lvl="1"/>
             <a:r>
-              <a:rPr lang="en-US" sz="1600" dirty="0"/>
-              <a:t>This describes:</a:t>
-            </a:r>
-          </a:p>
-          <a:p>
-            <a:pPr lvl="2"/>
-            <a:r>
-              <a:rPr lang="en-US" sz="1200" dirty="0"/>
-              <a:t>A) what the unique animations are (jumping, etc.)</a:t>
-            </a:r>
-          </a:p>
-          <a:p>
-            <a:pPr lvl="2"/>
-            <a:r>
-              <a:rPr lang="en-US" sz="1200" dirty="0"/>
-              <a:t>B) Where each frame of that animation is located in the sprite sheet (upper left corner in image and width height from there).</a:t>
+              <a:rPr lang="en-US" sz="2400" b="1" i="1" dirty="0"/>
+              <a:t>Playing</a:t>
+            </a:r>
+            <a:r>
+              <a:rPr lang="en-US" sz="2400" dirty="0"/>
+              <a:t>: true </a:t>
+            </a:r>
+            <a:r>
+              <a:rPr lang="en-US" sz="2400" dirty="0" err="1"/>
+              <a:t>iff</a:t>
+            </a:r>
+            <a:r>
+              <a:rPr lang="en-US" sz="2400" dirty="0"/>
+              <a:t> this animation is currently playing</a:t>
             </a:r>
           </a:p>
           <a:p>
             <a:pPr lvl="1"/>
             <a:r>
-              <a:rPr lang="en-US" sz="1600" dirty="0"/>
-              <a:t>Engine takes this information and parses it out, find the appropriate cutout from the </a:t>
-            </a:r>
-            <a:r>
-              <a:rPr lang="en-US" sz="1600" dirty="0" err="1"/>
-              <a:t>spritesheet</a:t>
-            </a:r>
-            <a:r>
-              <a:rPr lang="en-US" sz="1600" dirty="0"/>
-              <a:t>, etc.</a:t>
+              <a:rPr lang="en-US" sz="2400" b="1" i="1" dirty="0"/>
+              <a:t>Frames</a:t>
+            </a:r>
+            <a:r>
+              <a:rPr lang="en-US" sz="2400" dirty="0"/>
+              <a:t>: List of images of all of the frames</a:t>
             </a:r>
           </a:p>
           <a:p>
             <a:pPr lvl="1"/>
             <a:r>
-              <a:rPr lang="en-US" sz="1600" dirty="0"/>
-              <a:t>Good because we only have to load one image into memory and just use subsets of that one image. Only good if compact.</a:t>
-            </a:r>
-          </a:p>
-          <a:p>
-            <a:endParaRPr lang="en-US" sz="2000" dirty="0"/>
-          </a:p>
-          <a:p>
-            <a:r>
-              <a:rPr lang="en-US" sz="2000" dirty="0"/>
-              <a:t>Your engine does not need to support this. Individual images for each frame is fine.</a:t>
+              <a:rPr lang="en-US" sz="2400" b="1" i="1" dirty="0" err="1"/>
+              <a:t>currentFrame</a:t>
+            </a:r>
+            <a:r>
+              <a:rPr lang="en-US" sz="2400" b="1" i="1" dirty="0"/>
+              <a:t>/</a:t>
+            </a:r>
+            <a:r>
+              <a:rPr lang="en-US" sz="2400" b="1" i="1" dirty="0" err="1"/>
+              <a:t>startFrame</a:t>
+            </a:r>
+            <a:r>
+              <a:rPr lang="en-US" sz="2400" b="1" i="1" dirty="0"/>
+              <a:t>/</a:t>
+            </a:r>
+            <a:r>
+              <a:rPr lang="en-US" sz="2400" b="1" i="1" dirty="0" err="1"/>
+              <a:t>endFrame</a:t>
+            </a:r>
+            <a:r>
+              <a:rPr lang="en-US" sz="2400" dirty="0"/>
+              <a:t>: indices for which frame is playing, etc.</a:t>
+            </a:r>
+          </a:p>
+          <a:p>
+            <a:pPr lvl="1"/>
+            <a:r>
+              <a:rPr lang="en-US" sz="2400" b="1" i="1" dirty="0" err="1"/>
+              <a:t>animationSpeed</a:t>
+            </a:r>
+            <a:r>
+              <a:rPr lang="en-US" sz="2400" dirty="0"/>
+              <a:t>: How fast/often the frames switch</a:t>
+            </a:r>
+          </a:p>
+          <a:p>
+            <a:pPr lvl="1"/>
+            <a:r>
+              <a:rPr lang="en-US" sz="2400" dirty="0"/>
+              <a:t>Anything else?</a:t>
+            </a:r>
+          </a:p>
+          <a:p>
+            <a:pPr lvl="1"/>
+            <a:r>
+              <a:rPr lang="en-US" sz="2400" dirty="0"/>
+              <a:t>Remember this extends Sprite, so already has that functionality. </a:t>
+            </a:r>
+            <a:r>
+              <a:rPr lang="en-US" sz="2400" dirty="0" err="1"/>
+              <a:t>DisplayObject</a:t>
+            </a:r>
+            <a:r>
+              <a:rPr lang="en-US" sz="2400" dirty="0"/>
+              <a:t> will need a </a:t>
+            </a:r>
+            <a:r>
+              <a:rPr lang="en-US" sz="2400" dirty="0" err="1"/>
+              <a:t>setImage</a:t>
+            </a:r>
+            <a:r>
+              <a:rPr lang="en-US" sz="2400" dirty="0"/>
+              <a:t>() method that allows us to switch the image of this sprite.</a:t>
             </a:r>
           </a:p>
         </p:txBody>
@@ -13144,40 +12765,10 @@
           </a:p>
         </p:txBody>
       </p:sp>
-      <p:pic>
-        <p:nvPicPr>
-          <p:cNvPr id="5" name="Picture 4" descr="runningGrant.png"/>
-          <p:cNvPicPr>
-            <a:picLocks noChangeAspect="1"/>
-          </p:cNvPicPr>
-          <p:nvPr/>
-        </p:nvPicPr>
-        <p:blipFill>
-          <a:blip r:embed="rId3">
-            <a:extLst>
-              <a:ext uri="{28A0092B-C50C-407E-A947-70E740481C1C}">
-                <a14:useLocalDpi xmlns:a14="http://schemas.microsoft.com/office/drawing/2010/main" val="0"/>
-              </a:ext>
-            </a:extLst>
-          </a:blip>
-          <a:stretch>
-            <a:fillRect/>
-          </a:stretch>
-        </p:blipFill>
-        <p:spPr>
-          <a:xfrm>
-            <a:off x="4800600" y="1524000"/>
-            <a:ext cx="4191000" cy="4191000"/>
-          </a:xfrm>
-          <a:prstGeom prst="rect">
-            <a:avLst/>
-          </a:prstGeom>
-        </p:spPr>
-      </p:pic>
     </p:spTree>
     <p:extLst>
       <p:ext uri="{BB962C8B-B14F-4D97-AF65-F5344CB8AC3E}">
-        <p14:creationId xmlns:p14="http://schemas.microsoft.com/office/powerpoint/2010/main" val="2081847955"/>
+        <p14:creationId xmlns:p14="http://schemas.microsoft.com/office/powerpoint/2010/main" val="765557030"/>
       </p:ext>
     </p:extLst>
   </p:cSld>
@@ -13439,8 +13030,20 @@
           <a:lstStyle/>
           <a:p>
             <a:r>
+              <a:rPr lang="en-US" dirty="0" err="1"/>
+              <a:t>AnimatedSprite</a:t>
+            </a:r>
+            <a:r>
               <a:rPr lang="en-US" dirty="0"/>
-              <a:t>Summary</a:t>
+              <a:t> </a:t>
+            </a:r>
+            <a:r>
+              <a:rPr lang="en-US" dirty="0" err="1"/>
+              <a:t>Psuedo</a:t>
+            </a:r>
+            <a:r>
+              <a:rPr lang="en-US" dirty="0"/>
+              <a:t>-code</a:t>
             </a:r>
           </a:p>
         </p:txBody>
@@ -13460,85 +13063,327 @@
           <a:bodyPr/>
           <a:lstStyle/>
           <a:p>
-            <a:r>
-              <a:rPr lang="en-US" sz="1600" dirty="0"/>
-              <a:t>Classes You will be writing for your lab:</a:t>
-            </a:r>
-          </a:p>
-          <a:p>
-            <a:endParaRPr lang="en-US" sz="1600" dirty="0"/>
-          </a:p>
-          <a:p>
-            <a:r>
-              <a:rPr lang="en-US" sz="1600" dirty="0" err="1"/>
+            <a:pPr marL="0" indent="0">
+              <a:buNone/>
+            </a:pPr>
+            <a:r>
+              <a:rPr lang="en-US" sz="1400" dirty="0">
+                <a:latin typeface="Courier New"/>
+                <a:cs typeface="Courier New"/>
+              </a:rPr>
+              <a:t>/*NOTICE THIS IS JAVA-LIKE, BUT NOT EXACTLY VALID JAVA*/</a:t>
+            </a:r>
+          </a:p>
+          <a:p>
+            <a:pPr marL="0" indent="0">
+              <a:buNone/>
+            </a:pPr>
+            <a:endParaRPr lang="en-US" sz="1400" dirty="0">
+              <a:latin typeface="Courier New"/>
+              <a:cs typeface="Courier New"/>
+            </a:endParaRPr>
+          </a:p>
+          <a:p>
+            <a:pPr marL="0" indent="0">
+              <a:buNone/>
+            </a:pPr>
+            <a:r>
+              <a:rPr lang="en-US" sz="1400" dirty="0">
+                <a:latin typeface="Courier New"/>
+                <a:cs typeface="Courier New"/>
+              </a:rPr>
+              <a:t>protected override void Update(){</a:t>
+            </a:r>
+          </a:p>
+          <a:p>
+            <a:pPr marL="0" indent="0">
+              <a:buNone/>
+            </a:pPr>
+            <a:r>
+              <a:rPr lang="en-US" sz="1400" dirty="0">
+                <a:latin typeface="Courier New"/>
+                <a:cs typeface="Courier New"/>
+              </a:rPr>
+              <a:t>    if(playing){</a:t>
+            </a:r>
+          </a:p>
+          <a:p>
+            <a:pPr marL="0" indent="0">
+              <a:buNone/>
+            </a:pPr>
+            <a:r>
+              <a:rPr lang="en-US" sz="1400" dirty="0">
+                <a:latin typeface="Courier New"/>
+                <a:cs typeface="Courier New"/>
+              </a:rPr>
+              <a:t>        if(</a:t>
+            </a:r>
+            <a:r>
+              <a:rPr lang="en-US" sz="1400" dirty="0" err="1">
+                <a:latin typeface="Courier New"/>
+                <a:cs typeface="Courier New"/>
+              </a:rPr>
+              <a:t>clock.elapsedTime</a:t>
+            </a:r>
+            <a:r>
+              <a:rPr lang="en-US" sz="1400" dirty="0">
+                <a:latin typeface="Courier New"/>
+                <a:cs typeface="Courier New"/>
+              </a:rPr>
+              <a:t> &gt;= </a:t>
+            </a:r>
+            <a:r>
+              <a:rPr lang="en-US" sz="1400" dirty="0" err="1">
+                <a:latin typeface="Courier New"/>
+                <a:cs typeface="Courier New"/>
+              </a:rPr>
+              <a:t>animationSpeed</a:t>
+            </a:r>
+            <a:r>
+              <a:rPr lang="en-US" sz="1400" dirty="0">
+                <a:latin typeface="Courier New"/>
+                <a:cs typeface="Courier New"/>
+              </a:rPr>
+              <a:t>){</a:t>
+            </a:r>
+          </a:p>
+          <a:p>
+            <a:pPr marL="0" indent="0">
+              <a:buNone/>
+            </a:pPr>
+            <a:r>
+              <a:rPr lang="en-US" sz="1400" dirty="0">
+                <a:latin typeface="Courier New"/>
+                <a:cs typeface="Courier New"/>
+              </a:rPr>
+              <a:t>            </a:t>
+            </a:r>
+            <a:r>
+              <a:rPr lang="en-US" sz="1400" dirty="0" err="1">
+                <a:latin typeface="Courier New"/>
+                <a:cs typeface="Courier New"/>
+              </a:rPr>
+              <a:t>currentFrame</a:t>
+            </a:r>
+            <a:r>
+              <a:rPr lang="en-US" sz="1400" dirty="0">
+                <a:latin typeface="Courier New"/>
+                <a:cs typeface="Courier New"/>
+              </a:rPr>
+              <a:t>++; //need </a:t>
+            </a:r>
+            <a:r>
+              <a:rPr lang="en-US" sz="1400" dirty="0" err="1">
+                <a:latin typeface="Courier New"/>
+                <a:cs typeface="Courier New"/>
+              </a:rPr>
+              <a:t>currentFrame</a:t>
+            </a:r>
+            <a:r>
+              <a:rPr lang="en-US" sz="1400" dirty="0">
+                <a:latin typeface="Courier New"/>
+                <a:cs typeface="Courier New"/>
+              </a:rPr>
+              <a:t> to wrap, so this is buggy</a:t>
+            </a:r>
+          </a:p>
+          <a:p>
+            <a:pPr marL="0" indent="0">
+              <a:buNone/>
+            </a:pPr>
+            <a:r>
+              <a:rPr lang="en-US" sz="1400" dirty="0">
+                <a:latin typeface="Courier New"/>
+                <a:cs typeface="Courier New"/>
+              </a:rPr>
+              <a:t>            </a:t>
+            </a:r>
+            <a:r>
+              <a:rPr lang="en-US" sz="1400" dirty="0" err="1">
+                <a:latin typeface="Courier New"/>
+                <a:cs typeface="Courier New"/>
+              </a:rPr>
+              <a:t>super.setImage</a:t>
+            </a:r>
+            <a:r>
+              <a:rPr lang="en-US" sz="1400" dirty="0">
+                <a:latin typeface="Courier New"/>
+                <a:cs typeface="Courier New"/>
+              </a:rPr>
+              <a:t>(</a:t>
+            </a:r>
+            <a:r>
+              <a:rPr lang="en-US" sz="1400" dirty="0" err="1">
+                <a:latin typeface="Courier New"/>
+                <a:cs typeface="Courier New"/>
+              </a:rPr>
+              <a:t>frames.get</a:t>
+            </a:r>
+            <a:r>
+              <a:rPr lang="en-US" sz="1400" dirty="0">
+                <a:latin typeface="Courier New"/>
+                <a:cs typeface="Courier New"/>
+              </a:rPr>
+              <a:t>(</a:t>
+            </a:r>
+            <a:r>
+              <a:rPr lang="en-US" sz="1400" dirty="0" err="1">
+                <a:latin typeface="Courier New"/>
+                <a:cs typeface="Courier New"/>
+              </a:rPr>
+              <a:t>currentFrame</a:t>
+            </a:r>
+            <a:r>
+              <a:rPr lang="en-US" sz="1400" dirty="0">
+                <a:latin typeface="Courier New"/>
+                <a:cs typeface="Courier New"/>
+              </a:rPr>
+              <a:t>));</a:t>
+            </a:r>
+          </a:p>
+          <a:p>
+            <a:pPr marL="0" indent="0">
+              <a:buNone/>
+            </a:pPr>
+            <a:r>
+              <a:rPr lang="en-US" sz="1400" dirty="0">
+                <a:latin typeface="Courier New"/>
+                <a:cs typeface="Courier New"/>
+              </a:rPr>
+              <a:t>        }</a:t>
+            </a:r>
+          </a:p>
+          <a:p>
+            <a:pPr marL="0" indent="0">
+              <a:buNone/>
+            </a:pPr>
+            <a:r>
+              <a:rPr lang="en-US" sz="1400" dirty="0">
+                <a:latin typeface="Courier New"/>
+                <a:cs typeface="Courier New"/>
+              </a:rPr>
+              <a:t>    }</a:t>
+            </a:r>
+          </a:p>
+          <a:p>
+            <a:pPr marL="0" indent="0">
+              <a:buNone/>
+            </a:pPr>
+            <a:r>
+              <a:rPr lang="en-US" sz="1400" dirty="0">
+                <a:latin typeface="Courier New"/>
+                <a:cs typeface="Courier New"/>
+              </a:rPr>
+              <a:t>}</a:t>
+            </a:r>
+          </a:p>
+          <a:p>
+            <a:pPr marL="0" indent="0">
+              <a:buNone/>
+            </a:pPr>
+            <a:endParaRPr lang="en-US" sz="1400" dirty="0">
+              <a:latin typeface="Courier New"/>
+              <a:cs typeface="Courier New"/>
+            </a:endParaRPr>
+          </a:p>
+          <a:p>
+            <a:pPr marL="0" indent="0">
+              <a:buNone/>
+            </a:pPr>
+            <a:r>
+              <a:rPr lang="en-US" sz="1400" dirty="0">
+                <a:latin typeface="Courier New"/>
+                <a:cs typeface="Courier New"/>
+              </a:rPr>
+              <a:t>/* Notice that draw does not need to do anything differently */</a:t>
+            </a:r>
+          </a:p>
+          <a:p>
+            <a:pPr marL="0" indent="0">
+              <a:buNone/>
+            </a:pPr>
+            <a:r>
+              <a:rPr lang="en-US" sz="1400" dirty="0">
+                <a:latin typeface="Courier New"/>
+                <a:cs typeface="Courier New"/>
+              </a:rPr>
+              <a:t>protected override void Draw(Graphics g)</a:t>
+            </a:r>
+          </a:p>
+          <a:p>
+            <a:pPr marL="0" indent="0">
+              <a:buNone/>
+            </a:pPr>
+            <a:r>
+              <a:rPr lang="en-US" sz="1400" dirty="0">
+                <a:latin typeface="Courier New"/>
+                <a:cs typeface="Courier New"/>
+              </a:rPr>
+              <a:t>{</a:t>
+            </a:r>
+          </a:p>
+          <a:p>
+            <a:pPr marL="0" indent="0">
+              <a:buNone/>
+            </a:pPr>
+            <a:r>
+              <a:rPr lang="en-US" sz="1400" dirty="0">
+                <a:latin typeface="Courier New"/>
+                <a:cs typeface="Courier New"/>
+              </a:rPr>
+              <a:t>    /* Call the super draw method in </a:t>
+            </a:r>
+            <a:r>
+              <a:rPr lang="en-US" sz="1400" dirty="0" err="1">
+                <a:latin typeface="Courier New"/>
+                <a:cs typeface="Courier New"/>
+              </a:rPr>
               <a:t>DisplayObject</a:t>
             </a:r>
             <a:r>
-              <a:rPr lang="en-US" sz="1600" dirty="0"/>
-              <a:t>: A thing that can be drawn on the screen. Contains draw() and update methods. Everything on the screen MUST extend </a:t>
-            </a:r>
-            <a:r>
-              <a:rPr lang="en-US" sz="1600" dirty="0" err="1"/>
-              <a:t>DisplayObject</a:t>
-            </a:r>
-            <a:r>
-              <a:rPr lang="en-US" sz="1600" dirty="0"/>
-              <a:t>.</a:t>
-            </a:r>
-          </a:p>
-          <a:p>
-            <a:endParaRPr lang="en-US" sz="1600" dirty="0"/>
-          </a:p>
-          <a:p>
-            <a:r>
-              <a:rPr lang="en-US" sz="1600" dirty="0"/>
-              <a:t>????? There will be another class we put here between </a:t>
-            </a:r>
-            <a:r>
-              <a:rPr lang="en-US" sz="1600" dirty="0" err="1"/>
-              <a:t>DisplayObject</a:t>
-            </a:r>
-            <a:r>
-              <a:rPr lang="en-US" sz="1600" dirty="0"/>
-              <a:t> and Sprite. See next slide deck for details.</a:t>
-            </a:r>
-          </a:p>
-          <a:p>
-            <a:endParaRPr lang="en-US" sz="1600" dirty="0"/>
-          </a:p>
-          <a:p>
-            <a:r>
-              <a:rPr lang="en-US" sz="1600" dirty="0"/>
-              <a:t>Sprite extends </a:t>
-            </a:r>
-            <a:r>
-              <a:rPr lang="en-US" sz="1600" dirty="0" err="1"/>
-              <a:t>DisplayObject</a:t>
-            </a:r>
-            <a:r>
-              <a:rPr lang="en-US" sz="1600" dirty="0"/>
-              <a:t>: Placeholder for now. Contains basically no code but useful for programmer (i.e., new Sprite() instead of new </a:t>
-            </a:r>
-            <a:r>
-              <a:rPr lang="en-US" sz="1600" dirty="0" err="1"/>
-              <a:t>DisplayObject</a:t>
-            </a:r>
-            <a:r>
-              <a:rPr lang="en-US" sz="1600" dirty="0"/>
-              <a:t>()). Will have extra functionality once the mystery class above is filled in.</a:t>
-            </a:r>
-          </a:p>
-          <a:p>
-            <a:endParaRPr lang="en-US" sz="1600" dirty="0"/>
-          </a:p>
-          <a:p>
-            <a:r>
-              <a:rPr lang="en-US" sz="1600" dirty="0" err="1"/>
-              <a:t>AnimatedSprite</a:t>
-            </a:r>
-            <a:r>
-              <a:rPr lang="en-US" sz="1600" dirty="0"/>
-              <a:t> extends Sprite: Just like a sprite, but changes its image rapidly to give the appearance of animation.</a:t>
+              <a:rPr lang="en-US" sz="1400" dirty="0">
+                <a:latin typeface="Courier New"/>
+                <a:cs typeface="Courier New"/>
+              </a:rPr>
+              <a:t> class */</a:t>
+            </a:r>
+          </a:p>
+          <a:p>
+            <a:pPr marL="0" indent="0">
+              <a:buNone/>
+            </a:pPr>
+            <a:r>
+              <a:rPr lang="en-US" sz="1400" dirty="0">
+                <a:latin typeface="Courier New"/>
+                <a:cs typeface="Courier New"/>
+              </a:rPr>
+              <a:t>    </a:t>
+            </a:r>
+            <a:r>
+              <a:rPr lang="en-US" sz="1400" dirty="0" err="1">
+                <a:latin typeface="Courier New"/>
+                <a:cs typeface="Courier New"/>
+              </a:rPr>
+              <a:t>super.draw</a:t>
+            </a:r>
+            <a:r>
+              <a:rPr lang="en-US" sz="1400" dirty="0">
+                <a:latin typeface="Courier New"/>
+                <a:cs typeface="Courier New"/>
+              </a:rPr>
+              <a:t>(g);</a:t>
+            </a:r>
+          </a:p>
+          <a:p>
+            <a:pPr marL="0" indent="0">
+              <a:buNone/>
+            </a:pPr>
+            <a:r>
+              <a:rPr lang="en-US" sz="1400" dirty="0">
+                <a:latin typeface="Courier New"/>
+                <a:cs typeface="Courier New"/>
+              </a:rPr>
+              <a:t>}</a:t>
             </a:r>
           </a:p>
         </p:txBody>
@@ -13562,6 +13407,638 @@
               <a:rPr lang="en-US" altLang="zh-CN" smtClean="0"/>
               <a:pPr/>
               <a:t>40</a:t>
+            </a:fld>
+            <a:endParaRPr lang="en-US" altLang="zh-CN"/>
+          </a:p>
+        </p:txBody>
+      </p:sp>
+    </p:spTree>
+    <p:extLst>
+      <p:ext uri="{BB962C8B-B14F-4D97-AF65-F5344CB8AC3E}">
+        <p14:creationId xmlns:p14="http://schemas.microsoft.com/office/powerpoint/2010/main" val="3000868790"/>
+      </p:ext>
+    </p:extLst>
+  </p:cSld>
+  <p:clrMapOvr>
+    <a:masterClrMapping/>
+  </p:clrMapOvr>
+</p:sld>
+</file>
+
+<file path=ppt/slides/slide41.xml><?xml version="1.0" encoding="utf-8"?>
+<p:sld xmlns:a="http://schemas.openxmlformats.org/drawingml/2006/main" xmlns:r="http://schemas.openxmlformats.org/officeDocument/2006/relationships" xmlns:p="http://schemas.openxmlformats.org/presentationml/2006/main">
+  <p:cSld>
+    <p:spTree>
+      <p:nvGrpSpPr>
+        <p:cNvPr id="1" name=""/>
+        <p:cNvGrpSpPr/>
+        <p:nvPr/>
+      </p:nvGrpSpPr>
+      <p:grpSpPr>
+        <a:xfrm>
+          <a:off x="0" y="0"/>
+          <a:ext cx="0" cy="0"/>
+          <a:chOff x="0" y="0"/>
+          <a:chExt cx="0" cy="0"/>
+        </a:xfrm>
+      </p:grpSpPr>
+      <p:sp>
+        <p:nvSpPr>
+          <p:cNvPr id="2" name="Title 1"/>
+          <p:cNvSpPr>
+            <a:spLocks noGrp="1"/>
+          </p:cNvSpPr>
+          <p:nvPr>
+            <p:ph type="title"/>
+          </p:nvPr>
+        </p:nvSpPr>
+        <p:spPr/>
+        <p:txBody>
+          <a:bodyPr/>
+          <a:lstStyle/>
+          <a:p>
+            <a:r>
+              <a:rPr lang="en-US" dirty="0" err="1"/>
+              <a:t>AnimatedSprite</a:t>
+            </a:r>
+            <a:r>
+              <a:rPr lang="en-US" dirty="0"/>
+              <a:t>: Different Animations</a:t>
+            </a:r>
+          </a:p>
+        </p:txBody>
+      </p:sp>
+      <p:sp>
+        <p:nvSpPr>
+          <p:cNvPr id="3" name="Content Placeholder 2"/>
+          <p:cNvSpPr>
+            <a:spLocks noGrp="1"/>
+          </p:cNvSpPr>
+          <p:nvPr>
+            <p:ph idx="1"/>
+          </p:nvPr>
+        </p:nvSpPr>
+        <p:spPr/>
+        <p:txBody>
+          <a:bodyPr/>
+          <a:lstStyle/>
+          <a:p>
+            <a:r>
+              <a:rPr lang="en-US" sz="2400" dirty="0"/>
+              <a:t>Sometimes, an </a:t>
+            </a:r>
+            <a:r>
+              <a:rPr lang="en-US" sz="2400" dirty="0" err="1"/>
+              <a:t>AnimatedSprite</a:t>
+            </a:r>
+            <a:r>
+              <a:rPr lang="en-US" sz="2400" dirty="0"/>
+              <a:t> should contain different types of animations</a:t>
+            </a:r>
+          </a:p>
+          <a:p>
+            <a:pPr lvl="1"/>
+            <a:r>
+              <a:rPr lang="en-US" sz="2000" dirty="0"/>
+              <a:t>E.g., a walking animation and a jumping animation.</a:t>
+            </a:r>
+          </a:p>
+          <a:p>
+            <a:pPr lvl="1"/>
+            <a:r>
+              <a:rPr lang="en-US" sz="2000" dirty="0"/>
+              <a:t>Thus, you class should support this. I should be able to say:</a:t>
+            </a:r>
+          </a:p>
+          <a:p>
+            <a:pPr lvl="2"/>
+            <a:r>
+              <a:rPr lang="en-US" sz="1600" dirty="0" err="1"/>
+              <a:t>Object.setAnimation</a:t>
+            </a:r>
+            <a:r>
+              <a:rPr lang="en-US" sz="1600" dirty="0"/>
+              <a:t>(“jumping”)</a:t>
+            </a:r>
+          </a:p>
+          <a:p>
+            <a:pPr lvl="2"/>
+            <a:r>
+              <a:rPr lang="en-US" sz="1600" dirty="0" err="1"/>
+              <a:t>Object.play</a:t>
+            </a:r>
+            <a:r>
+              <a:rPr lang="en-US" sz="1600" dirty="0"/>
+              <a:t>()</a:t>
+            </a:r>
+          </a:p>
+          <a:p>
+            <a:pPr lvl="1"/>
+            <a:r>
+              <a:rPr lang="en-US" sz="2000" dirty="0"/>
+              <a:t>…and have the jump animation play.</a:t>
+            </a:r>
+          </a:p>
+          <a:p>
+            <a:pPr lvl="2"/>
+            <a:r>
+              <a:rPr lang="en-US" sz="1600" dirty="0"/>
+              <a:t>How might this work in code?</a:t>
+            </a:r>
+          </a:p>
+          <a:p>
+            <a:pPr lvl="2"/>
+            <a:r>
+              <a:rPr lang="en-US" sz="1600" dirty="0"/>
+              <a:t>Let’s discuss? There are several ways we could implement this.</a:t>
+            </a:r>
+          </a:p>
+        </p:txBody>
+      </p:sp>
+      <p:sp>
+        <p:nvSpPr>
+          <p:cNvPr id="4" name="Footer Placeholder 3"/>
+          <p:cNvSpPr>
+            <a:spLocks noGrp="1"/>
+          </p:cNvSpPr>
+          <p:nvPr>
+            <p:ph type="ftr" sz="quarter" idx="10"/>
+          </p:nvPr>
+        </p:nvSpPr>
+        <p:spPr/>
+        <p:txBody>
+          <a:bodyPr/>
+          <a:lstStyle/>
+          <a:p>
+            <a:fld id="{D0357299-C40C-42AB-B0C0-2E6E0A5A7F61}" type="slidenum">
+              <a:rPr lang="en-US" altLang="zh-CN" smtClean="0"/>
+              <a:pPr/>
+              <a:t>41</a:t>
+            </a:fld>
+            <a:endParaRPr lang="en-US" altLang="zh-CN"/>
+          </a:p>
+        </p:txBody>
+      </p:sp>
+    </p:spTree>
+    <p:extLst>
+      <p:ext uri="{BB962C8B-B14F-4D97-AF65-F5344CB8AC3E}">
+        <p14:creationId xmlns:p14="http://schemas.microsoft.com/office/powerpoint/2010/main" val="1864089032"/>
+      </p:ext>
+    </p:extLst>
+  </p:cSld>
+  <p:clrMapOvr>
+    <a:masterClrMapping/>
+  </p:clrMapOvr>
+</p:sld>
+</file>
+
+<file path=ppt/slides/slide42.xml><?xml version="1.0" encoding="utf-8"?>
+<p:sld xmlns:a="http://schemas.openxmlformats.org/drawingml/2006/main" xmlns:r="http://schemas.openxmlformats.org/officeDocument/2006/relationships" xmlns:p="http://schemas.openxmlformats.org/presentationml/2006/main">
+  <p:cSld>
+    <p:spTree>
+      <p:nvGrpSpPr>
+        <p:cNvPr id="1" name=""/>
+        <p:cNvGrpSpPr/>
+        <p:nvPr/>
+      </p:nvGrpSpPr>
+      <p:grpSpPr>
+        <a:xfrm>
+          <a:off x="0" y="0"/>
+          <a:ext cx="0" cy="0"/>
+          <a:chOff x="0" y="0"/>
+          <a:chExt cx="0" cy="0"/>
+        </a:xfrm>
+      </p:grpSpPr>
+      <p:sp>
+        <p:nvSpPr>
+          <p:cNvPr id="2" name="Title 1"/>
+          <p:cNvSpPr>
+            <a:spLocks noGrp="1"/>
+          </p:cNvSpPr>
+          <p:nvPr>
+            <p:ph type="title"/>
+          </p:nvPr>
+        </p:nvSpPr>
+        <p:spPr/>
+        <p:txBody>
+          <a:bodyPr/>
+          <a:lstStyle/>
+          <a:p>
+            <a:r>
+              <a:rPr lang="en-US" dirty="0"/>
+              <a:t>Sprite Sheets</a:t>
+            </a:r>
+          </a:p>
+        </p:txBody>
+      </p:sp>
+      <p:sp>
+        <p:nvSpPr>
+          <p:cNvPr id="4" name="Footer Placeholder 3"/>
+          <p:cNvSpPr>
+            <a:spLocks noGrp="1"/>
+          </p:cNvSpPr>
+          <p:nvPr>
+            <p:ph type="ftr" sz="quarter" idx="10"/>
+          </p:nvPr>
+        </p:nvSpPr>
+        <p:spPr/>
+        <p:txBody>
+          <a:bodyPr/>
+          <a:lstStyle/>
+          <a:p>
+            <a:fld id="{D0357299-C40C-42AB-B0C0-2E6E0A5A7F61}" type="slidenum">
+              <a:rPr lang="en-US" altLang="zh-CN" smtClean="0"/>
+              <a:pPr/>
+              <a:t>42</a:t>
+            </a:fld>
+            <a:endParaRPr lang="en-US" altLang="zh-CN"/>
+          </a:p>
+        </p:txBody>
+      </p:sp>
+      <p:pic>
+        <p:nvPicPr>
+          <p:cNvPr id="5" name="Picture 4" descr="runningGrant.png"/>
+          <p:cNvPicPr>
+            <a:picLocks noChangeAspect="1"/>
+          </p:cNvPicPr>
+          <p:nvPr/>
+        </p:nvPicPr>
+        <p:blipFill>
+          <a:blip r:embed="rId2">
+            <a:extLst>
+              <a:ext uri="{28A0092B-C50C-407E-A947-70E740481C1C}">
+                <a14:useLocalDpi xmlns:a14="http://schemas.microsoft.com/office/drawing/2010/main" val="0"/>
+              </a:ext>
+            </a:extLst>
+          </a:blip>
+          <a:stretch>
+            <a:fillRect/>
+          </a:stretch>
+        </p:blipFill>
+        <p:spPr>
+          <a:xfrm>
+            <a:off x="1905000" y="1143000"/>
+            <a:ext cx="5486400" cy="5486400"/>
+          </a:xfrm>
+          <a:prstGeom prst="rect">
+            <a:avLst/>
+          </a:prstGeom>
+        </p:spPr>
+      </p:pic>
+    </p:spTree>
+    <p:extLst>
+      <p:ext uri="{BB962C8B-B14F-4D97-AF65-F5344CB8AC3E}">
+        <p14:creationId xmlns:p14="http://schemas.microsoft.com/office/powerpoint/2010/main" val="3116034986"/>
+      </p:ext>
+    </p:extLst>
+  </p:cSld>
+  <p:clrMapOvr>
+    <a:masterClrMapping/>
+  </p:clrMapOvr>
+</p:sld>
+</file>
+
+<file path=ppt/slides/slide43.xml><?xml version="1.0" encoding="utf-8"?>
+<p:sld xmlns:a="http://schemas.openxmlformats.org/drawingml/2006/main" xmlns:r="http://schemas.openxmlformats.org/officeDocument/2006/relationships" xmlns:p="http://schemas.openxmlformats.org/presentationml/2006/main">
+  <p:cSld>
+    <p:spTree>
+      <p:nvGrpSpPr>
+        <p:cNvPr id="1" name=""/>
+        <p:cNvGrpSpPr/>
+        <p:nvPr/>
+      </p:nvGrpSpPr>
+      <p:grpSpPr>
+        <a:xfrm>
+          <a:off x="0" y="0"/>
+          <a:ext cx="0" cy="0"/>
+          <a:chOff x="0" y="0"/>
+          <a:chExt cx="0" cy="0"/>
+        </a:xfrm>
+      </p:grpSpPr>
+      <p:sp>
+        <p:nvSpPr>
+          <p:cNvPr id="2" name="Title 1"/>
+          <p:cNvSpPr>
+            <a:spLocks noGrp="1"/>
+          </p:cNvSpPr>
+          <p:nvPr>
+            <p:ph type="title"/>
+          </p:nvPr>
+        </p:nvSpPr>
+        <p:spPr/>
+        <p:txBody>
+          <a:bodyPr/>
+          <a:lstStyle/>
+          <a:p>
+            <a:r>
+              <a:rPr lang="en-US" dirty="0"/>
+              <a:t>Sprite Sheets</a:t>
+            </a:r>
+          </a:p>
+        </p:txBody>
+      </p:sp>
+      <p:sp>
+        <p:nvSpPr>
+          <p:cNvPr id="3" name="Content Placeholder 2"/>
+          <p:cNvSpPr>
+            <a:spLocks noGrp="1"/>
+          </p:cNvSpPr>
+          <p:nvPr>
+            <p:ph idx="1"/>
+          </p:nvPr>
+        </p:nvSpPr>
+        <p:spPr>
+          <a:xfrm>
+            <a:off x="381000" y="1143000"/>
+            <a:ext cx="4343400" cy="4876800"/>
+          </a:xfrm>
+        </p:spPr>
+        <p:txBody>
+          <a:bodyPr/>
+          <a:lstStyle/>
+          <a:p>
+            <a:r>
+              <a:rPr lang="en-US" sz="2000" dirty="0"/>
+              <a:t>Sprite sheets always come paired with an xml document.</a:t>
+            </a:r>
+          </a:p>
+          <a:p>
+            <a:pPr lvl="1"/>
+            <a:r>
+              <a:rPr lang="en-US" sz="1600" dirty="0"/>
+              <a:t>This describes:</a:t>
+            </a:r>
+          </a:p>
+          <a:p>
+            <a:pPr lvl="2"/>
+            <a:r>
+              <a:rPr lang="en-US" sz="1200" dirty="0"/>
+              <a:t>A) what the unique animations are (jumping, etc.)</a:t>
+            </a:r>
+          </a:p>
+          <a:p>
+            <a:pPr lvl="2"/>
+            <a:r>
+              <a:rPr lang="en-US" sz="1200" dirty="0"/>
+              <a:t>B) Where each frame of that animation is located in the sprite sheet (upper left corner in image and width height from there).</a:t>
+            </a:r>
+          </a:p>
+          <a:p>
+            <a:pPr lvl="1"/>
+            <a:r>
+              <a:rPr lang="en-US" sz="1600" dirty="0"/>
+              <a:t>Engine takes this information and parses it out, find the appropriate cutout from the </a:t>
+            </a:r>
+            <a:r>
+              <a:rPr lang="en-US" sz="1600" dirty="0" err="1"/>
+              <a:t>spritesheet</a:t>
+            </a:r>
+            <a:r>
+              <a:rPr lang="en-US" sz="1600" dirty="0"/>
+              <a:t>, etc.</a:t>
+            </a:r>
+          </a:p>
+          <a:p>
+            <a:pPr lvl="1"/>
+            <a:r>
+              <a:rPr lang="en-US" sz="1600" dirty="0"/>
+              <a:t>Good because we only have to load one image into memory and just use subsets of that one image. Only good if compact.</a:t>
+            </a:r>
+          </a:p>
+          <a:p>
+            <a:endParaRPr lang="en-US" sz="2000" dirty="0"/>
+          </a:p>
+          <a:p>
+            <a:r>
+              <a:rPr lang="en-US" sz="2000" dirty="0"/>
+              <a:t>Your engine does not need to support this. Individual images for each frame is fine.</a:t>
+            </a:r>
+          </a:p>
+        </p:txBody>
+      </p:sp>
+      <p:sp>
+        <p:nvSpPr>
+          <p:cNvPr id="4" name="Footer Placeholder 3"/>
+          <p:cNvSpPr>
+            <a:spLocks noGrp="1"/>
+          </p:cNvSpPr>
+          <p:nvPr>
+            <p:ph type="ftr" sz="quarter" idx="10"/>
+          </p:nvPr>
+        </p:nvSpPr>
+        <p:spPr/>
+        <p:txBody>
+          <a:bodyPr/>
+          <a:lstStyle/>
+          <a:p>
+            <a:fld id="{D0357299-C40C-42AB-B0C0-2E6E0A5A7F61}" type="slidenum">
+              <a:rPr lang="en-US" altLang="zh-CN" smtClean="0"/>
+              <a:pPr/>
+              <a:t>43</a:t>
+            </a:fld>
+            <a:endParaRPr lang="en-US" altLang="zh-CN"/>
+          </a:p>
+        </p:txBody>
+      </p:sp>
+      <p:pic>
+        <p:nvPicPr>
+          <p:cNvPr id="5" name="Picture 4" descr="runningGrant.png"/>
+          <p:cNvPicPr>
+            <a:picLocks noChangeAspect="1"/>
+          </p:cNvPicPr>
+          <p:nvPr/>
+        </p:nvPicPr>
+        <p:blipFill>
+          <a:blip r:embed="rId3">
+            <a:extLst>
+              <a:ext uri="{28A0092B-C50C-407E-A947-70E740481C1C}">
+                <a14:useLocalDpi xmlns:a14="http://schemas.microsoft.com/office/drawing/2010/main" val="0"/>
+              </a:ext>
+            </a:extLst>
+          </a:blip>
+          <a:stretch>
+            <a:fillRect/>
+          </a:stretch>
+        </p:blipFill>
+        <p:spPr>
+          <a:xfrm>
+            <a:off x="4800600" y="1524000"/>
+            <a:ext cx="4191000" cy="4191000"/>
+          </a:xfrm>
+          <a:prstGeom prst="rect">
+            <a:avLst/>
+          </a:prstGeom>
+        </p:spPr>
+      </p:pic>
+    </p:spTree>
+    <p:extLst>
+      <p:ext uri="{BB962C8B-B14F-4D97-AF65-F5344CB8AC3E}">
+        <p14:creationId xmlns:p14="http://schemas.microsoft.com/office/powerpoint/2010/main" val="2081847955"/>
+      </p:ext>
+    </p:extLst>
+  </p:cSld>
+  <p:clrMapOvr>
+    <a:masterClrMapping/>
+  </p:clrMapOvr>
+</p:sld>
+</file>
+
+<file path=ppt/slides/slide44.xml><?xml version="1.0" encoding="utf-8"?>
+<p:sld xmlns:a="http://schemas.openxmlformats.org/drawingml/2006/main" xmlns:r="http://schemas.openxmlformats.org/officeDocument/2006/relationships" xmlns:p="http://schemas.openxmlformats.org/presentationml/2006/main">
+  <p:cSld>
+    <p:spTree>
+      <p:nvGrpSpPr>
+        <p:cNvPr id="1" name=""/>
+        <p:cNvGrpSpPr/>
+        <p:nvPr/>
+      </p:nvGrpSpPr>
+      <p:grpSpPr>
+        <a:xfrm>
+          <a:off x="0" y="0"/>
+          <a:ext cx="0" cy="0"/>
+          <a:chOff x="0" y="0"/>
+          <a:chExt cx="0" cy="0"/>
+        </a:xfrm>
+      </p:grpSpPr>
+      <p:sp>
+        <p:nvSpPr>
+          <p:cNvPr id="2" name="Title 1"/>
+          <p:cNvSpPr>
+            <a:spLocks noGrp="1"/>
+          </p:cNvSpPr>
+          <p:nvPr>
+            <p:ph type="title"/>
+          </p:nvPr>
+        </p:nvSpPr>
+        <p:spPr/>
+        <p:txBody>
+          <a:bodyPr/>
+          <a:lstStyle/>
+          <a:p>
+            <a:r>
+              <a:rPr lang="en-US" dirty="0"/>
+              <a:t>Summary</a:t>
+            </a:r>
+          </a:p>
+        </p:txBody>
+      </p:sp>
+      <p:sp>
+        <p:nvSpPr>
+          <p:cNvPr id="3" name="Content Placeholder 2"/>
+          <p:cNvSpPr>
+            <a:spLocks noGrp="1"/>
+          </p:cNvSpPr>
+          <p:nvPr>
+            <p:ph idx="1"/>
+          </p:nvPr>
+        </p:nvSpPr>
+        <p:spPr/>
+        <p:txBody>
+          <a:bodyPr/>
+          <a:lstStyle/>
+          <a:p>
+            <a:r>
+              <a:rPr lang="en-US" sz="1600" dirty="0"/>
+              <a:t>Classes You will be writing for your lab:</a:t>
+            </a:r>
+          </a:p>
+          <a:p>
+            <a:endParaRPr lang="en-US" sz="1600" dirty="0"/>
+          </a:p>
+          <a:p>
+            <a:r>
+              <a:rPr lang="en-US" sz="1600" dirty="0" err="1"/>
+              <a:t>DisplayObject</a:t>
+            </a:r>
+            <a:r>
+              <a:rPr lang="en-US" sz="1600" dirty="0"/>
+              <a:t>: A thing that can be drawn on the screen. Contains draw() and update methods. Everything on the screen MUST extend </a:t>
+            </a:r>
+            <a:r>
+              <a:rPr lang="en-US" sz="1600" dirty="0" err="1"/>
+              <a:t>DisplayObject</a:t>
+            </a:r>
+            <a:r>
+              <a:rPr lang="en-US" sz="1600" dirty="0"/>
+              <a:t>.</a:t>
+            </a:r>
+          </a:p>
+          <a:p>
+            <a:endParaRPr lang="en-US" sz="1600" dirty="0"/>
+          </a:p>
+          <a:p>
+            <a:r>
+              <a:rPr lang="en-US" sz="1600" dirty="0"/>
+              <a:t>????? There will be another class we put here between </a:t>
+            </a:r>
+            <a:r>
+              <a:rPr lang="en-US" sz="1600" dirty="0" err="1"/>
+              <a:t>DisplayObject</a:t>
+            </a:r>
+            <a:r>
+              <a:rPr lang="en-US" sz="1600" dirty="0"/>
+              <a:t> and Sprite. See next slide deck for details.</a:t>
+            </a:r>
+          </a:p>
+          <a:p>
+            <a:endParaRPr lang="en-US" sz="1600" dirty="0"/>
+          </a:p>
+          <a:p>
+            <a:r>
+              <a:rPr lang="en-US" sz="1600" dirty="0"/>
+              <a:t>Sprite extends </a:t>
+            </a:r>
+            <a:r>
+              <a:rPr lang="en-US" sz="1600" dirty="0" err="1"/>
+              <a:t>DisplayObject</a:t>
+            </a:r>
+            <a:r>
+              <a:rPr lang="en-US" sz="1600" dirty="0"/>
+              <a:t>: Placeholder for now. Contains basically no code but useful for programmer (i.e., new Sprite() instead of new </a:t>
+            </a:r>
+            <a:r>
+              <a:rPr lang="en-US" sz="1600" dirty="0" err="1"/>
+              <a:t>DisplayObject</a:t>
+            </a:r>
+            <a:r>
+              <a:rPr lang="en-US" sz="1600" dirty="0"/>
+              <a:t>()). Will have extra functionality once the mystery class above is filled in.</a:t>
+            </a:r>
+          </a:p>
+          <a:p>
+            <a:endParaRPr lang="en-US" sz="1600" dirty="0"/>
+          </a:p>
+          <a:p>
+            <a:r>
+              <a:rPr lang="en-US" sz="1600" dirty="0" err="1"/>
+              <a:t>AnimatedSprite</a:t>
+            </a:r>
+            <a:r>
+              <a:rPr lang="en-US" sz="1600" dirty="0"/>
+              <a:t> extends Sprite: Just like a sprite, but changes its image rapidly to give the appearance of animation.</a:t>
+            </a:r>
+          </a:p>
+        </p:txBody>
+      </p:sp>
+      <p:sp>
+        <p:nvSpPr>
+          <p:cNvPr id="4" name="Footer Placeholder 3"/>
+          <p:cNvSpPr>
+            <a:spLocks noGrp="1"/>
+          </p:cNvSpPr>
+          <p:nvPr>
+            <p:ph type="ftr" sz="quarter" idx="10"/>
+          </p:nvPr>
+        </p:nvSpPr>
+        <p:spPr/>
+        <p:txBody>
+          <a:bodyPr/>
+          <a:lstStyle/>
+          <a:p>
+            <a:fld id="{D0357299-C40C-42AB-B0C0-2E6E0A5A7F61}" type="slidenum">
+              <a:rPr lang="en-US" altLang="zh-CN" smtClean="0"/>
+              <a:pPr/>
+              <a:t>44</a:t>
             </a:fld>
             <a:endParaRPr lang="en-US" altLang="zh-CN"/>
           </a:p>

</xml_diff>